<commit_message>
Hands on Exercises added to pptx
</commit_message>
<xml_diff>
--- a/Version Control/Lesson 03 - Git Working With Others/AI2C Git - Working with Others.pptx
+++ b/Version Control/Lesson 03 - Git Working With Others/AI2C Git - Working with Others.pptx
@@ -5,18 +5,23 @@
     <p:sldMasterId id="2147483680" r:id="rId5"/>
   </p:sldMasterIdLst>
   <p:notesMasterIdLst>
-    <p:notesMasterId r:id="rId15"/>
+    <p:notesMasterId r:id="rId20"/>
   </p:notesMasterIdLst>
   <p:sldIdLst>
     <p:sldId id="256" r:id="rId6"/>
     <p:sldId id="257" r:id="rId7"/>
-    <p:sldId id="259" r:id="rId8"/>
-    <p:sldId id="260" r:id="rId9"/>
-    <p:sldId id="261" r:id="rId10"/>
-    <p:sldId id="262" r:id="rId11"/>
-    <p:sldId id="263" r:id="rId12"/>
-    <p:sldId id="258" r:id="rId13"/>
-    <p:sldId id="264" r:id="rId14"/>
+    <p:sldId id="265" r:id="rId8"/>
+    <p:sldId id="259" r:id="rId9"/>
+    <p:sldId id="260" r:id="rId10"/>
+    <p:sldId id="261" r:id="rId11"/>
+    <p:sldId id="262" r:id="rId12"/>
+    <p:sldId id="263" r:id="rId13"/>
+    <p:sldId id="258" r:id="rId14"/>
+    <p:sldId id="264" r:id="rId15"/>
+    <p:sldId id="267" r:id="rId16"/>
+    <p:sldId id="266" r:id="rId17"/>
+    <p:sldId id="268" r:id="rId18"/>
+    <p:sldId id="269" r:id="rId19"/>
   </p:sldIdLst>
   <p:sldSz cx="12192000" cy="6858000"/>
   <p:notesSz cx="6858000" cy="9144000"/>
@@ -214,7 +219,7 @@
           <a:p>
             <a:fld id="{691C588C-9717-44ED-B9A9-CBD9D1909AD4}" type="datetimeFigureOut">
               <a:rPr lang="en-US" smtClean="0"/>
-              <a:t>12/22/2025</a:t>
+              <a:t>1/5/2026</a:t>
             </a:fld>
             <a:endParaRPr lang="en-US"/>
           </a:p>
@@ -481,6 +486,457 @@
 </p:notesMaster>
 </file>
 
+<file path=ppt/notesSlides/notesSlide1.xml><?xml version="1.0" encoding="utf-8"?>
+<p:notes xmlns:a="http://schemas.openxmlformats.org/drawingml/2006/main" xmlns:r="http://schemas.openxmlformats.org/officeDocument/2006/relationships" xmlns:p="http://schemas.openxmlformats.org/presentationml/2006/main">
+  <p:cSld>
+    <p:spTree>
+      <p:nvGrpSpPr>
+        <p:cNvPr id="1" name=""/>
+        <p:cNvGrpSpPr/>
+        <p:nvPr/>
+      </p:nvGrpSpPr>
+      <p:grpSpPr>
+        <a:xfrm>
+          <a:off x="0" y="0"/>
+          <a:ext cx="0" cy="0"/>
+          <a:chOff x="0" y="0"/>
+          <a:chExt cx="0" cy="0"/>
+        </a:xfrm>
+      </p:grpSpPr>
+      <p:sp>
+        <p:nvSpPr>
+          <p:cNvPr id="2" name="Slide Image Placeholder 1"/>
+          <p:cNvSpPr>
+            <a:spLocks noGrp="1" noRot="1" noChangeAspect="1"/>
+          </p:cNvSpPr>
+          <p:nvPr>
+            <p:ph type="sldImg"/>
+          </p:nvPr>
+        </p:nvSpPr>
+        <p:spPr/>
+      </p:sp>
+      <p:sp>
+        <p:nvSpPr>
+          <p:cNvPr id="3" name="Notes Placeholder 2"/>
+          <p:cNvSpPr>
+            <a:spLocks noGrp="1"/>
+          </p:cNvSpPr>
+          <p:nvPr>
+            <p:ph type="body" idx="1"/>
+          </p:nvPr>
+        </p:nvSpPr>
+        <p:spPr/>
+        <p:txBody>
+          <a:bodyPr/>
+          <a:lstStyle/>
+          <a:p>
+            <a:r>
+              <a:rPr lang="en-US" dirty="0"/>
+              <a:t>Have students pull up </a:t>
+            </a:r>
+            <a:r>
+              <a:rPr lang="en-US" dirty="0" err="1"/>
+              <a:t>Github</a:t>
+            </a:r>
+            <a:r>
+              <a:rPr lang="en-US" dirty="0"/>
+              <a:t>.  Show them (in this order):</a:t>
+            </a:r>
+          </a:p>
+          <a:p>
+            <a:r>
+              <a:rPr lang="en-US" dirty="0"/>
+              <a:t>How to navigate to Repositories</a:t>
+            </a:r>
+          </a:p>
+          <a:p>
+            <a:r>
+              <a:rPr lang="en-US" dirty="0"/>
+              <a:t>How to navigate to settings --- &gt; developer settings</a:t>
+            </a:r>
+          </a:p>
+          <a:p>
+            <a:r>
+              <a:rPr lang="en-US" dirty="0"/>
+              <a:t>How to navigate to settings --- &gt; SSH/ PAT</a:t>
+            </a:r>
+          </a:p>
+          <a:p>
+            <a:r>
+              <a:rPr lang="en-US" dirty="0"/>
+              <a:t>How to navigate to settings of a specific repository</a:t>
+            </a:r>
+          </a:p>
+          <a:p>
+            <a:r>
+              <a:rPr lang="en-US" dirty="0"/>
+              <a:t>How to create a repository</a:t>
+            </a:r>
+          </a:p>
+          <a:p>
+            <a:endParaRPr lang="en-US" dirty="0"/>
+          </a:p>
+        </p:txBody>
+      </p:sp>
+      <p:sp>
+        <p:nvSpPr>
+          <p:cNvPr id="4" name="Slide Number Placeholder 3"/>
+          <p:cNvSpPr>
+            <a:spLocks noGrp="1"/>
+          </p:cNvSpPr>
+          <p:nvPr>
+            <p:ph type="sldNum" sz="quarter" idx="5"/>
+          </p:nvPr>
+        </p:nvSpPr>
+        <p:spPr/>
+        <p:txBody>
+          <a:bodyPr/>
+          <a:lstStyle/>
+          <a:p>
+            <a:fld id="{460BBBCE-FA44-432B-84B0-7537B159768C}" type="slidenum">
+              <a:rPr lang="en-US" smtClean="0"/>
+              <a:t>3</a:t>
+            </a:fld>
+            <a:endParaRPr lang="en-US"/>
+          </a:p>
+        </p:txBody>
+      </p:sp>
+    </p:spTree>
+    <p:extLst>
+      <p:ext uri="{BB962C8B-B14F-4D97-AF65-F5344CB8AC3E}">
+        <p14:creationId xmlns:p14="http://schemas.microsoft.com/office/powerpoint/2010/main" val="1463426493"/>
+      </p:ext>
+    </p:extLst>
+  </p:cSld>
+  <p:clrMapOvr>
+    <a:masterClrMapping/>
+  </p:clrMapOvr>
+</p:notes>
+</file>
+
+<file path=ppt/notesSlides/notesSlide2.xml><?xml version="1.0" encoding="utf-8"?>
+<p:notes xmlns:a="http://schemas.openxmlformats.org/drawingml/2006/main" xmlns:r="http://schemas.openxmlformats.org/officeDocument/2006/relationships" xmlns:p="http://schemas.openxmlformats.org/presentationml/2006/main">
+  <p:cSld>
+    <p:spTree>
+      <p:nvGrpSpPr>
+        <p:cNvPr id="1" name=""/>
+        <p:cNvGrpSpPr/>
+        <p:nvPr/>
+      </p:nvGrpSpPr>
+      <p:grpSpPr>
+        <a:xfrm>
+          <a:off x="0" y="0"/>
+          <a:ext cx="0" cy="0"/>
+          <a:chOff x="0" y="0"/>
+          <a:chExt cx="0" cy="0"/>
+        </a:xfrm>
+      </p:grpSpPr>
+      <p:sp>
+        <p:nvSpPr>
+          <p:cNvPr id="2" name="Slide Image Placeholder 1"/>
+          <p:cNvSpPr>
+            <a:spLocks noGrp="1" noRot="1" noChangeAspect="1"/>
+          </p:cNvSpPr>
+          <p:nvPr>
+            <p:ph type="sldImg"/>
+          </p:nvPr>
+        </p:nvSpPr>
+        <p:spPr/>
+      </p:sp>
+      <p:sp>
+        <p:nvSpPr>
+          <p:cNvPr id="3" name="Notes Placeholder 2"/>
+          <p:cNvSpPr>
+            <a:spLocks noGrp="1"/>
+          </p:cNvSpPr>
+          <p:nvPr>
+            <p:ph type="body" idx="1"/>
+          </p:nvPr>
+        </p:nvSpPr>
+        <p:spPr/>
+        <p:txBody>
+          <a:bodyPr/>
+          <a:lstStyle/>
+          <a:p>
+            <a:pPr marL="0" marR="0" lvl="0" indent="0" algn="l" defTabSz="914400" rtl="0" eaLnBrk="1" fontAlgn="auto" latinLnBrk="0" hangingPunct="1">
+              <a:lnSpc>
+                <a:spcPct val="100000"/>
+              </a:lnSpc>
+              <a:spcBef>
+                <a:spcPts val="0"/>
+              </a:spcBef>
+              <a:spcAft>
+                <a:spcPts val="0"/>
+              </a:spcAft>
+              <a:buClrTx/>
+              <a:buSzTx/>
+              <a:buFontTx/>
+              <a:buNone/>
+              <a:tabLst/>
+              <a:defRPr/>
+            </a:pPr>
+            <a:r>
+              <a:rPr lang="en-US" dirty="0"/>
+              <a:t>Walk through creating a remote repository.  Create a sample code file in the repository using GitHub.  </a:t>
+            </a:r>
+          </a:p>
+          <a:p>
+            <a:endParaRPr lang="en-US" dirty="0"/>
+          </a:p>
+        </p:txBody>
+      </p:sp>
+      <p:sp>
+        <p:nvSpPr>
+          <p:cNvPr id="4" name="Slide Number Placeholder 3"/>
+          <p:cNvSpPr>
+            <a:spLocks noGrp="1"/>
+          </p:cNvSpPr>
+          <p:nvPr>
+            <p:ph type="sldNum" sz="quarter" idx="5"/>
+          </p:nvPr>
+        </p:nvSpPr>
+        <p:spPr/>
+        <p:txBody>
+          <a:bodyPr/>
+          <a:lstStyle/>
+          <a:p>
+            <a:fld id="{460BBBCE-FA44-432B-84B0-7537B159768C}" type="slidenum">
+              <a:rPr lang="en-US" smtClean="0"/>
+              <a:t>10</a:t>
+            </a:fld>
+            <a:endParaRPr lang="en-US"/>
+          </a:p>
+        </p:txBody>
+      </p:sp>
+    </p:spTree>
+    <p:extLst>
+      <p:ext uri="{BB962C8B-B14F-4D97-AF65-F5344CB8AC3E}">
+        <p14:creationId xmlns:p14="http://schemas.microsoft.com/office/powerpoint/2010/main" val="4163516396"/>
+      </p:ext>
+    </p:extLst>
+  </p:cSld>
+  <p:clrMapOvr>
+    <a:masterClrMapping/>
+  </p:clrMapOvr>
+</p:notes>
+</file>
+
+<file path=ppt/notesSlides/notesSlide3.xml><?xml version="1.0" encoding="utf-8"?>
+<p:notes xmlns:a="http://schemas.openxmlformats.org/drawingml/2006/main" xmlns:r="http://schemas.openxmlformats.org/officeDocument/2006/relationships" xmlns:p="http://schemas.openxmlformats.org/presentationml/2006/main">
+  <p:cSld>
+    <p:spTree>
+      <p:nvGrpSpPr>
+        <p:cNvPr id="1" name="">
+          <a:extLst>
+            <a:ext uri="{FF2B5EF4-FFF2-40B4-BE49-F238E27FC236}">
+              <a16:creationId xmlns:a16="http://schemas.microsoft.com/office/drawing/2014/main" id="{E4B8C3F2-54DA-F4FD-36B9-290EB81FEBEE}"/>
+            </a:ext>
+          </a:extLst>
+        </p:cNvPr>
+        <p:cNvGrpSpPr/>
+        <p:nvPr/>
+      </p:nvGrpSpPr>
+      <p:grpSpPr>
+        <a:xfrm>
+          <a:off x="0" y="0"/>
+          <a:ext cx="0" cy="0"/>
+          <a:chOff x="0" y="0"/>
+          <a:chExt cx="0" cy="0"/>
+        </a:xfrm>
+      </p:grpSpPr>
+      <p:sp>
+        <p:nvSpPr>
+          <p:cNvPr id="2" name="Slide Image Placeholder 1">
+            <a:extLst>
+              <a:ext uri="{FF2B5EF4-FFF2-40B4-BE49-F238E27FC236}">
+                <a16:creationId xmlns:a16="http://schemas.microsoft.com/office/drawing/2014/main" id="{4DE2C22B-E01E-F3EC-E09A-F5AA5EE26CC3}"/>
+              </a:ext>
+            </a:extLst>
+          </p:cNvPr>
+          <p:cNvSpPr>
+            <a:spLocks noGrp="1" noRot="1" noChangeAspect="1"/>
+          </p:cNvSpPr>
+          <p:nvPr>
+            <p:ph type="sldImg"/>
+          </p:nvPr>
+        </p:nvSpPr>
+        <p:spPr/>
+      </p:sp>
+      <p:sp>
+        <p:nvSpPr>
+          <p:cNvPr id="3" name="Notes Placeholder 2">
+            <a:extLst>
+              <a:ext uri="{FF2B5EF4-FFF2-40B4-BE49-F238E27FC236}">
+                <a16:creationId xmlns:a16="http://schemas.microsoft.com/office/drawing/2014/main" id="{9514148E-018E-09E3-0BBC-4E4D3C82089B}"/>
+              </a:ext>
+            </a:extLst>
+          </p:cNvPr>
+          <p:cNvSpPr>
+            <a:spLocks noGrp="1"/>
+          </p:cNvSpPr>
+          <p:nvPr>
+            <p:ph type="body" idx="1"/>
+          </p:nvPr>
+        </p:nvSpPr>
+        <p:spPr/>
+        <p:txBody>
+          <a:bodyPr/>
+          <a:lstStyle/>
+          <a:p>
+            <a:endParaRPr lang="en-US" dirty="0"/>
+          </a:p>
+        </p:txBody>
+      </p:sp>
+      <p:sp>
+        <p:nvSpPr>
+          <p:cNvPr id="4" name="Slide Number Placeholder 3">
+            <a:extLst>
+              <a:ext uri="{FF2B5EF4-FFF2-40B4-BE49-F238E27FC236}">
+                <a16:creationId xmlns:a16="http://schemas.microsoft.com/office/drawing/2014/main" id="{642CBCBC-A968-D070-3469-AACCEF5724CC}"/>
+              </a:ext>
+            </a:extLst>
+          </p:cNvPr>
+          <p:cNvSpPr>
+            <a:spLocks noGrp="1"/>
+          </p:cNvSpPr>
+          <p:nvPr>
+            <p:ph type="sldNum" sz="quarter" idx="5"/>
+          </p:nvPr>
+        </p:nvSpPr>
+        <p:spPr/>
+        <p:txBody>
+          <a:bodyPr/>
+          <a:lstStyle/>
+          <a:p>
+            <a:fld id="{460BBBCE-FA44-432B-84B0-7537B159768C}" type="slidenum">
+              <a:rPr lang="en-US" smtClean="0"/>
+              <a:t>12</a:t>
+            </a:fld>
+            <a:endParaRPr lang="en-US"/>
+          </a:p>
+        </p:txBody>
+      </p:sp>
+    </p:spTree>
+    <p:extLst>
+      <p:ext uri="{BB962C8B-B14F-4D97-AF65-F5344CB8AC3E}">
+        <p14:creationId xmlns:p14="http://schemas.microsoft.com/office/powerpoint/2010/main" val="2706561098"/>
+      </p:ext>
+    </p:extLst>
+  </p:cSld>
+  <p:clrMapOvr>
+    <a:masterClrMapping/>
+  </p:clrMapOvr>
+</p:notes>
+</file>
+
+<file path=ppt/notesSlides/notesSlide4.xml><?xml version="1.0" encoding="utf-8"?>
+<p:notes xmlns:a="http://schemas.openxmlformats.org/drawingml/2006/main" xmlns:r="http://schemas.openxmlformats.org/officeDocument/2006/relationships" xmlns:p="http://schemas.openxmlformats.org/presentationml/2006/main">
+  <p:cSld>
+    <p:spTree>
+      <p:nvGrpSpPr>
+        <p:cNvPr id="1" name="">
+          <a:extLst>
+            <a:ext uri="{FF2B5EF4-FFF2-40B4-BE49-F238E27FC236}">
+              <a16:creationId xmlns:a16="http://schemas.microsoft.com/office/drawing/2014/main" id="{2EDFBE46-56EA-29D4-DB59-BB0D7E1B9BF8}"/>
+            </a:ext>
+          </a:extLst>
+        </p:cNvPr>
+        <p:cNvGrpSpPr/>
+        <p:nvPr/>
+      </p:nvGrpSpPr>
+      <p:grpSpPr>
+        <a:xfrm>
+          <a:off x="0" y="0"/>
+          <a:ext cx="0" cy="0"/>
+          <a:chOff x="0" y="0"/>
+          <a:chExt cx="0" cy="0"/>
+        </a:xfrm>
+      </p:grpSpPr>
+      <p:sp>
+        <p:nvSpPr>
+          <p:cNvPr id="2" name="Slide Image Placeholder 1">
+            <a:extLst>
+              <a:ext uri="{FF2B5EF4-FFF2-40B4-BE49-F238E27FC236}">
+                <a16:creationId xmlns:a16="http://schemas.microsoft.com/office/drawing/2014/main" id="{CA73920E-9C5E-69B7-47FA-79348F017715}"/>
+              </a:ext>
+            </a:extLst>
+          </p:cNvPr>
+          <p:cNvSpPr>
+            <a:spLocks noGrp="1" noRot="1" noChangeAspect="1"/>
+          </p:cNvSpPr>
+          <p:nvPr>
+            <p:ph type="sldImg"/>
+          </p:nvPr>
+        </p:nvSpPr>
+        <p:spPr/>
+      </p:sp>
+      <p:sp>
+        <p:nvSpPr>
+          <p:cNvPr id="3" name="Notes Placeholder 2">
+            <a:extLst>
+              <a:ext uri="{FF2B5EF4-FFF2-40B4-BE49-F238E27FC236}">
+                <a16:creationId xmlns:a16="http://schemas.microsoft.com/office/drawing/2014/main" id="{697ED94A-893C-C875-BECB-177E46B1BDA2}"/>
+              </a:ext>
+            </a:extLst>
+          </p:cNvPr>
+          <p:cNvSpPr>
+            <a:spLocks noGrp="1"/>
+          </p:cNvSpPr>
+          <p:nvPr>
+            <p:ph type="body" idx="1"/>
+          </p:nvPr>
+        </p:nvSpPr>
+        <p:spPr/>
+        <p:txBody>
+          <a:bodyPr/>
+          <a:lstStyle/>
+          <a:p>
+            <a:endParaRPr lang="en-US" dirty="0"/>
+          </a:p>
+        </p:txBody>
+      </p:sp>
+      <p:sp>
+        <p:nvSpPr>
+          <p:cNvPr id="4" name="Slide Number Placeholder 3">
+            <a:extLst>
+              <a:ext uri="{FF2B5EF4-FFF2-40B4-BE49-F238E27FC236}">
+                <a16:creationId xmlns:a16="http://schemas.microsoft.com/office/drawing/2014/main" id="{895A0263-A35A-090D-9D53-C8E6178D801B}"/>
+              </a:ext>
+            </a:extLst>
+          </p:cNvPr>
+          <p:cNvSpPr>
+            <a:spLocks noGrp="1"/>
+          </p:cNvSpPr>
+          <p:nvPr>
+            <p:ph type="sldNum" sz="quarter" idx="5"/>
+          </p:nvPr>
+        </p:nvSpPr>
+        <p:spPr/>
+        <p:txBody>
+          <a:bodyPr/>
+          <a:lstStyle/>
+          <a:p>
+            <a:fld id="{460BBBCE-FA44-432B-84B0-7537B159768C}" type="slidenum">
+              <a:rPr lang="en-US" smtClean="0"/>
+              <a:t>14</a:t>
+            </a:fld>
+            <a:endParaRPr lang="en-US"/>
+          </a:p>
+        </p:txBody>
+      </p:sp>
+    </p:spTree>
+    <p:extLst>
+      <p:ext uri="{BB962C8B-B14F-4D97-AF65-F5344CB8AC3E}">
+        <p14:creationId xmlns:p14="http://schemas.microsoft.com/office/powerpoint/2010/main" val="685895057"/>
+      </p:ext>
+    </p:extLst>
+  </p:cSld>
+  <p:clrMapOvr>
+    <a:masterClrMapping/>
+  </p:clrMapOvr>
+</p:notes>
+</file>
+
 <file path=ppt/slideLayouts/slideLayout1.xml><?xml version="1.0" encoding="utf-8"?>
 <p:sldLayout xmlns:a="http://schemas.openxmlformats.org/drawingml/2006/main" xmlns:r="http://schemas.openxmlformats.org/officeDocument/2006/relationships" xmlns:p="http://schemas.openxmlformats.org/presentationml/2006/main" preserve="1" userDrawn="1">
   <p:cSld name="Title Slide">
@@ -521,7 +977,7 @@
           <a:p>
             <a:fld id="{7A3E0868-4E26-4CDC-8A56-D70E2D8B12FE}" type="datetime3">
               <a:rPr lang="en-US" smtClean="0"/>
-              <a:t>22 December 2025</a:t>
+              <a:t>5 January 2026</a:t>
             </a:fld>
             <a:endParaRPr lang="en-US"/>
           </a:p>
@@ -3082,7 +3538,7 @@
           <a:p>
             <a:fld id="{A7B8021B-6105-4216-96FC-94348F216D0E}" type="datetime3">
               <a:rPr lang="en-US" smtClean="0"/>
-              <a:t>22 December 2025</a:t>
+              <a:t>5 January 2026</a:t>
             </a:fld>
             <a:endParaRPr lang="en-US"/>
           </a:p>
@@ -4771,7 +5227,7 @@
           <a:p>
             <a:fld id="{5D27CFAB-73E6-44A8-B862-B3306344E3F2}" type="datetime3">
               <a:rPr lang="en-US" smtClean="0"/>
-              <a:t>22 December 2025</a:t>
+              <a:t>5 January 2026</a:t>
             </a:fld>
             <a:endParaRPr lang="en-US"/>
           </a:p>
@@ -6561,7 +7017,7 @@
           <a:p>
             <a:fld id="{A9B2E784-A5F5-4301-881B-94AC8DBF9DED}" type="datetime3">
               <a:rPr lang="en-US" smtClean="0"/>
-              <a:t>22 December 2025</a:t>
+              <a:t>5 January 2026</a:t>
             </a:fld>
             <a:endParaRPr lang="en-US"/>
           </a:p>
@@ -6740,7 +7196,7 @@
           <a:p>
             <a:fld id="{18EAB3A5-9E92-4BB9-8F22-9632B4FBEDBA}" type="datetime3">
               <a:rPr lang="en-US" smtClean="0"/>
-              <a:t>22 December 2025</a:t>
+              <a:t>5 January 2026</a:t>
             </a:fld>
             <a:endParaRPr lang="en-US"/>
           </a:p>
@@ -6967,7 +7423,7 @@
           <a:p>
             <a:fld id="{40923810-5FB2-48C9-96CA-1DE2C4773142}" type="datetime3">
               <a:rPr lang="en-US" smtClean="0"/>
-              <a:t>22 December 2025</a:t>
+              <a:t>5 January 2026</a:t>
             </a:fld>
             <a:endParaRPr lang="en-US"/>
           </a:p>
@@ -7257,7 +7713,7 @@
           <a:p>
             <a:fld id="{E50EFF4B-86EB-42FB-93EA-7D8F9CB2466F}" type="datetime3">
               <a:rPr lang="en-US" smtClean="0"/>
-              <a:t>22 December 2025</a:t>
+              <a:t>5 January 2026</a:t>
             </a:fld>
             <a:endParaRPr lang="en-US"/>
           </a:p>
@@ -7869,7 +8325,7 @@
           <a:p>
             <a:fld id="{FB14FC24-E041-45E9-9A72-E5755A86890F}" type="datetime3">
               <a:rPr lang="en-US" smtClean="0"/>
-              <a:t>22 December 2025</a:t>
+              <a:t>5 January 2026</a:t>
             </a:fld>
             <a:endParaRPr lang="en-US"/>
           </a:p>
@@ -8729,7 +9185,7 @@
           <a:p>
             <a:fld id="{98A19125-94A7-4474-858C-FD9C4ABE9DDA}" type="datetime3">
               <a:rPr lang="en-US" smtClean="0"/>
-              <a:t>22 December 2025</a:t>
+              <a:t>5 January 2026</a:t>
             </a:fld>
             <a:endParaRPr lang="en-US"/>
           </a:p>
@@ -9832,7 +10288,7 @@
           <a:p>
             <a:fld id="{3BA0343D-C8D8-43CE-BB79-50DEA219DB07}" type="datetime3">
               <a:rPr lang="en-US" smtClean="0"/>
-              <a:t>22 December 2025</a:t>
+              <a:t>5 January 2026</a:t>
             </a:fld>
             <a:endParaRPr lang="en-US"/>
           </a:p>
@@ -10113,7 +10569,7 @@
           <a:p>
             <a:fld id="{453BD212-0B9F-4987-965F-AC83B2FC354F}" type="datetime3">
               <a:rPr lang="en-US" smtClean="0"/>
-              <a:t>22 December 2025</a:t>
+              <a:t>5 January 2026</a:t>
             </a:fld>
             <a:endParaRPr lang="en-US"/>
           </a:p>
@@ -10351,7 +10807,7 @@
           <a:p>
             <a:fld id="{6DDC931E-8CBE-4A3F-A034-9B6122C6DCDB}" type="datetime3">
               <a:rPr lang="en-US" smtClean="0"/>
-              <a:t>22 December 2025</a:t>
+              <a:t>5 January 2026</a:t>
             </a:fld>
             <a:endParaRPr lang="en-US"/>
           </a:p>
@@ -12109,7 +12565,7 @@
           <a:p>
             <a:fld id="{220AF9C2-5E8A-4308-AE6B-CA9B65007D0E}" type="datetime3">
               <a:rPr lang="en-US" smtClean="0"/>
-              <a:t>22 December 2025</a:t>
+              <a:t>5 January 2026</a:t>
             </a:fld>
             <a:endParaRPr lang="en-US"/>
           </a:p>
@@ -12417,7 +12873,7 @@
           <a:p>
             <a:fld id="{FF31E861-D2AF-431D-860B-DCF67C218052}" type="datetime3">
               <a:rPr lang="en-US" smtClean="0"/>
-              <a:t>22 December 2025</a:t>
+              <a:t>5 January 2026</a:t>
             </a:fld>
             <a:endParaRPr lang="en-US"/>
           </a:p>
@@ -12691,7 +13147,7 @@
           <a:p>
             <a:fld id="{D1DA25B2-AAF1-4C1F-AA38-12D5BFA7D4C8}" type="datetime3">
               <a:rPr lang="en-US" smtClean="0"/>
-              <a:t>22 December 2025</a:t>
+              <a:t>5 January 2026</a:t>
             </a:fld>
             <a:endParaRPr lang="en-US"/>
           </a:p>
@@ -12962,7 +13418,7 @@
           <a:p>
             <a:fld id="{A25C0F39-45D0-48E9-90B3-7FE8FCE561C8}" type="datetime3">
               <a:rPr lang="en-US" smtClean="0"/>
-              <a:t>22 December 2025</a:t>
+              <a:t>5 January 2026</a:t>
             </a:fld>
             <a:endParaRPr lang="en-US"/>
           </a:p>
@@ -13458,7 +13914,7 @@
           <a:p>
             <a:fld id="{9BAF1A3D-92FA-4F24-9781-74AFA516A230}" type="datetime3">
               <a:rPr lang="en-US" smtClean="0"/>
-              <a:t>22 December 2025</a:t>
+              <a:t>5 January 2026</a:t>
             </a:fld>
             <a:endParaRPr lang="en-US"/>
           </a:p>
@@ -13585,7 +14041,7 @@
           <a:p>
             <a:fld id="{5719C672-856D-4617-A693-8FE15749A9B7}" type="datetime3">
               <a:rPr lang="en-US" smtClean="0"/>
-              <a:t>22 December 2025</a:t>
+              <a:t>5 January 2026</a:t>
             </a:fld>
             <a:endParaRPr lang="en-US"/>
           </a:p>
@@ -13712,7 +14168,7 @@
           <a:p>
             <a:fld id="{5F6C764D-A39E-4C03-B161-E0BC66E8883B}" type="datetime3">
               <a:rPr lang="en-US" smtClean="0"/>
-              <a:t>22 December 2025</a:t>
+              <a:t>5 January 2026</a:t>
             </a:fld>
             <a:endParaRPr lang="en-US"/>
           </a:p>
@@ -13950,7 +14406,7 @@
           <a:p>
             <a:fld id="{6E3E33F9-20B7-4995-BE7D-165DBB597850}" type="datetime3">
               <a:rPr lang="en-US" smtClean="0"/>
-              <a:t>22 December 2025</a:t>
+              <a:t>5 January 2026</a:t>
             </a:fld>
             <a:endParaRPr lang="en-US"/>
           </a:p>
@@ -14055,7 +14511,7 @@
           <a:p>
             <a:fld id="{CD41C263-3501-4369-A962-62B6BF915CDE}" type="datetime3">
               <a:rPr lang="en-US" smtClean="0"/>
-              <a:t>22 December 2025</a:t>
+              <a:t>5 January 2026</a:t>
             </a:fld>
             <a:endParaRPr lang="en-US"/>
           </a:p>
@@ -14450,7 +14906,7 @@
           <a:p>
             <a:fld id="{B06F3EBE-B2E8-4992-9F00-9E4B44F057C0}" type="datetime3">
               <a:rPr lang="en-US" smtClean="0"/>
-              <a:t>22 December 2025</a:t>
+              <a:t>5 January 2026</a:t>
             </a:fld>
             <a:endParaRPr lang="en-US"/>
           </a:p>
@@ -14568,7 +15024,7 @@
           <a:p>
             <a:fld id="{D41656AB-D2E1-472E-8B95-0DF5C6E1D623}" type="datetime3">
               <a:rPr lang="en-US" smtClean="0"/>
-              <a:t>22 December 2025</a:t>
+              <a:t>5 January 2026</a:t>
             </a:fld>
             <a:endParaRPr lang="en-US"/>
           </a:p>
@@ -16421,7 +16877,7 @@
           <a:p>
             <a:fld id="{AD622D1A-DF83-41A8-85FF-04D90BF831D3}" type="datetime3">
               <a:rPr lang="en-US" smtClean="0"/>
-              <a:t>22 December 2025</a:t>
+              <a:t>5 January 2026</a:t>
             </a:fld>
             <a:endParaRPr lang="en-US"/>
           </a:p>
@@ -16671,7 +17127,7 @@
           <a:p>
             <a:fld id="{334F72C3-CDF3-44A8-B602-1649B1728485}" type="datetime3">
               <a:rPr lang="en-US" smtClean="0"/>
-              <a:t>22 December 2025</a:t>
+              <a:t>5 January 2026</a:t>
             </a:fld>
             <a:endParaRPr lang="en-US"/>
           </a:p>
@@ -16978,7 +17434,7 @@
           <a:p>
             <a:fld id="{1E0132BA-B5E7-4FFD-AF6C-169169D47D4A}" type="datetime3">
               <a:rPr lang="en-US" smtClean="0"/>
-              <a:t>22 December 2025</a:t>
+              <a:t>5 January 2026</a:t>
             </a:fld>
             <a:endParaRPr lang="en-US"/>
           </a:p>
@@ -17459,7 +17915,7 @@
           <a:p>
             <a:fld id="{81A30091-1C2A-4151-8D3C-D1E47A72615F}" type="datetime3">
               <a:rPr lang="en-US" smtClean="0"/>
-              <a:t>22 December 2025</a:t>
+              <a:t>5 January 2026</a:t>
             </a:fld>
             <a:endParaRPr lang="en-US"/>
           </a:p>
@@ -18096,7 +18552,7 @@
           <a:p>
             <a:fld id="{35D703CE-07B4-4C05-A488-B4566700621F}" type="datetime3">
               <a:rPr lang="en-US" smtClean="0"/>
-              <a:t>22 December 2025</a:t>
+              <a:t>5 January 2026</a:t>
             </a:fld>
             <a:endParaRPr lang="en-US"/>
           </a:p>
@@ -19146,7 +19602,7 @@
           <a:p>
             <a:fld id="{694BD61C-20BA-43AF-A21F-1DAFB3200099}" type="datetime3">
               <a:rPr lang="en-US" smtClean="0"/>
-              <a:t>22 December 2025</a:t>
+              <a:t>5 January 2026</a:t>
             </a:fld>
             <a:endParaRPr lang="en-US"/>
           </a:p>
@@ -19636,7 +20092,7 @@
           <a:p>
             <a:fld id="{CABCB1B0-B6E5-4DD1-BB55-95C076D6C0C8}" type="datetime3">
               <a:rPr lang="en-US" smtClean="0"/>
-              <a:t>22 December 2025</a:t>
+              <a:t>5 January 2026</a:t>
             </a:fld>
             <a:endParaRPr lang="en-US"/>
           </a:p>
@@ -20178,7 +20634,7 @@
           <a:p>
             <a:fld id="{7A3E0868-4E26-4CDC-8A56-D70E2D8B12FE}" type="datetime3">
               <a:rPr lang="en-US" smtClean="0"/>
-              <a:t>22 December 2025</a:t>
+              <a:t>5 January 2026</a:t>
             </a:fld>
             <a:endParaRPr lang="en-US"/>
           </a:p>
@@ -20568,6 +21024,1116 @@
     <p:extLst>
       <p:ext uri="{BB962C8B-B14F-4D97-AF65-F5344CB8AC3E}">
         <p14:creationId xmlns:p14="http://schemas.microsoft.com/office/powerpoint/2010/main" val="2737738001"/>
+      </p:ext>
+    </p:extLst>
+  </p:cSld>
+  <p:clrMapOvr>
+    <a:masterClrMapping/>
+  </p:clrMapOvr>
+</p:sld>
+</file>
+
+<file path=ppt/slides/slide10.xml><?xml version="1.0" encoding="utf-8"?>
+<p:sld xmlns:a="http://schemas.openxmlformats.org/drawingml/2006/main" xmlns:r="http://schemas.openxmlformats.org/officeDocument/2006/relationships" xmlns:p="http://schemas.openxmlformats.org/presentationml/2006/main">
+  <p:cSld>
+    <p:bg>
+      <p:bgPr>
+        <a:solidFill>
+          <a:schemeClr val="tx1"/>
+        </a:solidFill>
+        <a:effectLst/>
+      </p:bgPr>
+    </p:bg>
+    <p:spTree>
+      <p:nvGrpSpPr>
+        <p:cNvPr id="1" name="">
+          <a:extLst>
+            <a:ext uri="{FF2B5EF4-FFF2-40B4-BE49-F238E27FC236}">
+              <a16:creationId xmlns:a16="http://schemas.microsoft.com/office/drawing/2014/main" id="{B9358F57-D057-5E4D-0C64-48BD653DEF10}"/>
+            </a:ext>
+          </a:extLst>
+        </p:cNvPr>
+        <p:cNvGrpSpPr/>
+        <p:nvPr/>
+      </p:nvGrpSpPr>
+      <p:grpSpPr>
+        <a:xfrm>
+          <a:off x="0" y="0"/>
+          <a:ext cx="0" cy="0"/>
+          <a:chOff x="0" y="0"/>
+          <a:chExt cx="0" cy="0"/>
+        </a:xfrm>
+      </p:grpSpPr>
+      <p:sp>
+        <p:nvSpPr>
+          <p:cNvPr id="17" name="Title 16">
+            <a:extLst>
+              <a:ext uri="{FF2B5EF4-FFF2-40B4-BE49-F238E27FC236}">
+                <a16:creationId xmlns:a16="http://schemas.microsoft.com/office/drawing/2014/main" id="{CB4F9626-8DB8-38BD-A0EF-1D8574BC9D22}"/>
+              </a:ext>
+            </a:extLst>
+          </p:cNvPr>
+          <p:cNvSpPr>
+            <a:spLocks noGrp="1"/>
+          </p:cNvSpPr>
+          <p:nvPr>
+            <p:ph type="title"/>
+          </p:nvPr>
+        </p:nvSpPr>
+        <p:spPr/>
+        <p:txBody>
+          <a:bodyPr/>
+          <a:lstStyle/>
+          <a:p>
+            <a:r>
+              <a:rPr lang="en-US" dirty="0">
+                <a:solidFill>
+                  <a:schemeClr val="bg2"/>
+                </a:solidFill>
+                <a:ea typeface="+mj-lt"/>
+                <a:cs typeface="+mj-lt"/>
+              </a:rPr>
+              <a:t>Hands-On #1 </a:t>
+            </a:r>
+            <a:r>
+              <a:rPr lang="en-US" dirty="0">
+                <a:solidFill>
+                  <a:schemeClr val="bg2"/>
+                </a:solidFill>
+                <a:cs typeface="Arial"/>
+              </a:rPr>
+              <a:t>:</a:t>
+            </a:r>
+            <a:endParaRPr lang="en-US" dirty="0">
+              <a:solidFill>
+                <a:schemeClr val="bg2"/>
+              </a:solidFill>
+            </a:endParaRPr>
+          </a:p>
+        </p:txBody>
+      </p:sp>
+      <p:sp>
+        <p:nvSpPr>
+          <p:cNvPr id="18" name="Content Placeholder 17">
+            <a:extLst>
+              <a:ext uri="{FF2B5EF4-FFF2-40B4-BE49-F238E27FC236}">
+                <a16:creationId xmlns:a16="http://schemas.microsoft.com/office/drawing/2014/main" id="{B0CFAD0C-5EE1-5F79-E38C-2C75451C08DE}"/>
+              </a:ext>
+            </a:extLst>
+          </p:cNvPr>
+          <p:cNvSpPr>
+            <a:spLocks noGrp="1"/>
+          </p:cNvSpPr>
+          <p:nvPr>
+            <p:ph idx="1"/>
+          </p:nvPr>
+        </p:nvSpPr>
+        <p:spPr>
+          <a:xfrm>
+            <a:off x="548640" y="1679025"/>
+            <a:ext cx="10710239" cy="4493173"/>
+          </a:xfrm>
+        </p:spPr>
+        <p:txBody>
+          <a:bodyPr vert="horz" lIns="0" tIns="0" rIns="0" bIns="0" spcCol="365760" rtlCol="0" anchor="t">
+            <a:noAutofit/>
+          </a:bodyPr>
+          <a:lstStyle/>
+          <a:p>
+            <a:r>
+              <a:rPr lang="en-US" sz="2800" dirty="0">
+                <a:solidFill>
+                  <a:schemeClr val="bg2"/>
+                </a:solidFill>
+                <a:ea typeface="+mn-lt"/>
+                <a:cs typeface="+mn-lt"/>
+              </a:rPr>
+              <a:t>Create a remote repository</a:t>
+            </a:r>
+          </a:p>
+          <a:p>
+            <a:r>
+              <a:rPr lang="en-US" sz="2800" dirty="0">
+                <a:solidFill>
+                  <a:schemeClr val="bg2"/>
+                </a:solidFill>
+                <a:ea typeface="+mn-lt"/>
+                <a:cs typeface="+mn-lt"/>
+              </a:rPr>
+              <a:t>Push/pull from the remote repository </a:t>
+            </a:r>
+            <a:endParaRPr lang="en-US" sz="2800" dirty="0">
+              <a:solidFill>
+                <a:schemeClr val="bg2"/>
+              </a:solidFill>
+              <a:cs typeface="Arial"/>
+            </a:endParaRPr>
+          </a:p>
+          <a:p>
+            <a:endParaRPr lang="en-US" sz="2800" dirty="0">
+              <a:solidFill>
+                <a:schemeClr val="bg2"/>
+              </a:solidFill>
+              <a:cs typeface="Arial"/>
+            </a:endParaRPr>
+          </a:p>
+          <a:p>
+            <a:endParaRPr lang="en-US" sz="2800" dirty="0">
+              <a:solidFill>
+                <a:schemeClr val="bg2"/>
+              </a:solidFill>
+              <a:cs typeface="Arial"/>
+            </a:endParaRPr>
+          </a:p>
+          <a:p>
+            <a:endParaRPr lang="en-US" sz="2800" dirty="0">
+              <a:solidFill>
+                <a:schemeClr val="bg2"/>
+              </a:solidFill>
+              <a:cs typeface="Arial"/>
+            </a:endParaRPr>
+          </a:p>
+          <a:p>
+            <a:endParaRPr lang="en-US" sz="2800" dirty="0">
+              <a:solidFill>
+                <a:schemeClr val="bg2"/>
+              </a:solidFill>
+              <a:cs typeface="Arial"/>
+            </a:endParaRPr>
+          </a:p>
+        </p:txBody>
+      </p:sp>
+      <p:sp>
+        <p:nvSpPr>
+          <p:cNvPr id="2" name="Date Placeholder 1">
+            <a:extLst>
+              <a:ext uri="{FF2B5EF4-FFF2-40B4-BE49-F238E27FC236}">
+                <a16:creationId xmlns:a16="http://schemas.microsoft.com/office/drawing/2014/main" id="{B8E33109-0765-3E74-7233-0C09D380A369}"/>
+              </a:ext>
+            </a:extLst>
+          </p:cNvPr>
+          <p:cNvSpPr>
+            <a:spLocks noGrp="1"/>
+          </p:cNvSpPr>
+          <p:nvPr>
+            <p:ph type="dt" sz="half" idx="10"/>
+          </p:nvPr>
+        </p:nvSpPr>
+        <p:spPr/>
+        <p:txBody>
+          <a:bodyPr/>
+          <a:lstStyle/>
+          <a:p>
+            <a:fld id="{6DDC931E-8CBE-4A3F-A034-9B6122C6DCDB}" type="datetime3">
+              <a:rPr lang="en-US" smtClean="0"/>
+              <a:t>5 January 2026</a:t>
+            </a:fld>
+            <a:endParaRPr lang="en-US"/>
+          </a:p>
+        </p:txBody>
+      </p:sp>
+      <p:sp>
+        <p:nvSpPr>
+          <p:cNvPr id="3" name="Slide Number Placeholder 2">
+            <a:extLst>
+              <a:ext uri="{FF2B5EF4-FFF2-40B4-BE49-F238E27FC236}">
+                <a16:creationId xmlns:a16="http://schemas.microsoft.com/office/drawing/2014/main" id="{70701A8B-EB85-90A1-F4A4-3A425B9310BB}"/>
+              </a:ext>
+            </a:extLst>
+          </p:cNvPr>
+          <p:cNvSpPr>
+            <a:spLocks noGrp="1"/>
+          </p:cNvSpPr>
+          <p:nvPr>
+            <p:ph type="sldNum" sz="quarter" idx="11"/>
+          </p:nvPr>
+        </p:nvSpPr>
+        <p:spPr/>
+        <p:txBody>
+          <a:bodyPr/>
+          <a:lstStyle/>
+          <a:p>
+            <a:fld id="{64E5BE4B-2FBF-4174-9E62-85FAD1CB43A6}" type="slidenum">
+              <a:rPr lang="en-US" smtClean="0"/>
+              <a:pPr/>
+              <a:t>10</a:t>
+            </a:fld>
+            <a:endParaRPr lang="en-US"/>
+          </a:p>
+        </p:txBody>
+      </p:sp>
+    </p:spTree>
+    <p:extLst>
+      <p:ext uri="{BB962C8B-B14F-4D97-AF65-F5344CB8AC3E}">
+        <p14:creationId xmlns:p14="http://schemas.microsoft.com/office/powerpoint/2010/main" val="2072483286"/>
+      </p:ext>
+    </p:extLst>
+  </p:cSld>
+  <p:clrMapOvr>
+    <a:masterClrMapping/>
+  </p:clrMapOvr>
+</p:sld>
+</file>
+
+<file path=ppt/slides/slide11.xml><?xml version="1.0" encoding="utf-8"?>
+<p:sld xmlns:a="http://schemas.openxmlformats.org/drawingml/2006/main" xmlns:r="http://schemas.openxmlformats.org/officeDocument/2006/relationships" xmlns:p="http://schemas.openxmlformats.org/presentationml/2006/main">
+  <p:cSld>
+    <p:spTree>
+      <p:nvGrpSpPr>
+        <p:cNvPr id="1" name="">
+          <a:extLst>
+            <a:ext uri="{FF2B5EF4-FFF2-40B4-BE49-F238E27FC236}">
+              <a16:creationId xmlns:a16="http://schemas.microsoft.com/office/drawing/2014/main" id="{028B984F-E940-B5E6-1C26-1C63BD40848C}"/>
+            </a:ext>
+          </a:extLst>
+        </p:cNvPr>
+        <p:cNvGrpSpPr/>
+        <p:nvPr/>
+      </p:nvGrpSpPr>
+      <p:grpSpPr>
+        <a:xfrm>
+          <a:off x="0" y="0"/>
+          <a:ext cx="0" cy="0"/>
+          <a:chOff x="0" y="0"/>
+          <a:chExt cx="0" cy="0"/>
+        </a:xfrm>
+      </p:grpSpPr>
+      <p:sp>
+        <p:nvSpPr>
+          <p:cNvPr id="17" name="Title 16">
+            <a:extLst>
+              <a:ext uri="{FF2B5EF4-FFF2-40B4-BE49-F238E27FC236}">
+                <a16:creationId xmlns:a16="http://schemas.microsoft.com/office/drawing/2014/main" id="{38E844AB-1F65-ECA4-5F4C-33E8EE5D22F8}"/>
+              </a:ext>
+            </a:extLst>
+          </p:cNvPr>
+          <p:cNvSpPr>
+            <a:spLocks noGrp="1"/>
+          </p:cNvSpPr>
+          <p:nvPr>
+            <p:ph type="title"/>
+          </p:nvPr>
+        </p:nvSpPr>
+        <p:spPr/>
+        <p:txBody>
+          <a:bodyPr/>
+          <a:lstStyle/>
+          <a:p>
+            <a:r>
+              <a:rPr lang="en-US" dirty="0">
+                <a:solidFill>
+                  <a:schemeClr val="bg2"/>
+                </a:solidFill>
+                <a:cs typeface="Arial"/>
+              </a:rPr>
+              <a:t>Questions?</a:t>
+            </a:r>
+          </a:p>
+        </p:txBody>
+      </p:sp>
+      <p:sp>
+        <p:nvSpPr>
+          <p:cNvPr id="18" name="Content Placeholder 17">
+            <a:extLst>
+              <a:ext uri="{FF2B5EF4-FFF2-40B4-BE49-F238E27FC236}">
+                <a16:creationId xmlns:a16="http://schemas.microsoft.com/office/drawing/2014/main" id="{6E919F0E-08FC-893A-294E-C0242FD57B17}"/>
+              </a:ext>
+            </a:extLst>
+          </p:cNvPr>
+          <p:cNvSpPr>
+            <a:spLocks noGrp="1"/>
+          </p:cNvSpPr>
+          <p:nvPr>
+            <p:ph idx="1"/>
+          </p:nvPr>
+        </p:nvSpPr>
+        <p:spPr/>
+        <p:txBody>
+          <a:bodyPr/>
+          <a:lstStyle/>
+          <a:p>
+            <a:endParaRPr lang="en-US"/>
+          </a:p>
+        </p:txBody>
+      </p:sp>
+      <p:sp>
+        <p:nvSpPr>
+          <p:cNvPr id="2" name="Date Placeholder 1">
+            <a:extLst>
+              <a:ext uri="{FF2B5EF4-FFF2-40B4-BE49-F238E27FC236}">
+                <a16:creationId xmlns:a16="http://schemas.microsoft.com/office/drawing/2014/main" id="{AC08D23D-9527-D99E-A5C1-44D5A46E7062}"/>
+              </a:ext>
+            </a:extLst>
+          </p:cNvPr>
+          <p:cNvSpPr>
+            <a:spLocks noGrp="1"/>
+          </p:cNvSpPr>
+          <p:nvPr>
+            <p:ph type="dt" sz="half" idx="10"/>
+          </p:nvPr>
+        </p:nvSpPr>
+        <p:spPr/>
+        <p:txBody>
+          <a:bodyPr/>
+          <a:lstStyle/>
+          <a:p>
+            <a:fld id="{6DDC931E-8CBE-4A3F-A034-9B6122C6DCDB}" type="datetime3">
+              <a:rPr lang="en-US" smtClean="0"/>
+              <a:t>5 January 2026</a:t>
+            </a:fld>
+            <a:endParaRPr lang="en-US"/>
+          </a:p>
+        </p:txBody>
+      </p:sp>
+      <p:sp>
+        <p:nvSpPr>
+          <p:cNvPr id="3" name="Slide Number Placeholder 2">
+            <a:extLst>
+              <a:ext uri="{FF2B5EF4-FFF2-40B4-BE49-F238E27FC236}">
+                <a16:creationId xmlns:a16="http://schemas.microsoft.com/office/drawing/2014/main" id="{B26B209E-2DA0-E93D-104B-454CA508E514}"/>
+              </a:ext>
+            </a:extLst>
+          </p:cNvPr>
+          <p:cNvSpPr>
+            <a:spLocks noGrp="1"/>
+          </p:cNvSpPr>
+          <p:nvPr>
+            <p:ph type="sldNum" sz="quarter" idx="11"/>
+          </p:nvPr>
+        </p:nvSpPr>
+        <p:spPr/>
+        <p:txBody>
+          <a:bodyPr/>
+          <a:lstStyle/>
+          <a:p>
+            <a:fld id="{64E5BE4B-2FBF-4174-9E62-85FAD1CB43A6}" type="slidenum">
+              <a:rPr lang="en-US" smtClean="0"/>
+              <a:pPr/>
+              <a:t>11</a:t>
+            </a:fld>
+            <a:endParaRPr lang="en-US"/>
+          </a:p>
+        </p:txBody>
+      </p:sp>
+    </p:spTree>
+    <p:extLst>
+      <p:ext uri="{BB962C8B-B14F-4D97-AF65-F5344CB8AC3E}">
+        <p14:creationId xmlns:p14="http://schemas.microsoft.com/office/powerpoint/2010/main" val="1491884782"/>
+      </p:ext>
+    </p:extLst>
+  </p:cSld>
+  <p:clrMapOvr>
+    <a:masterClrMapping/>
+  </p:clrMapOvr>
+</p:sld>
+</file>
+
+<file path=ppt/slides/slide12.xml><?xml version="1.0" encoding="utf-8"?>
+<p:sld xmlns:a="http://schemas.openxmlformats.org/drawingml/2006/main" xmlns:r="http://schemas.openxmlformats.org/officeDocument/2006/relationships" xmlns:p="http://schemas.openxmlformats.org/presentationml/2006/main">
+  <p:cSld>
+    <p:spTree>
+      <p:nvGrpSpPr>
+        <p:cNvPr id="1" name="">
+          <a:extLst>
+            <a:ext uri="{FF2B5EF4-FFF2-40B4-BE49-F238E27FC236}">
+              <a16:creationId xmlns:a16="http://schemas.microsoft.com/office/drawing/2014/main" id="{8702DBD6-032A-C355-E384-BB7280A5BB89}"/>
+            </a:ext>
+          </a:extLst>
+        </p:cNvPr>
+        <p:cNvGrpSpPr/>
+        <p:nvPr/>
+      </p:nvGrpSpPr>
+      <p:grpSpPr>
+        <a:xfrm>
+          <a:off x="0" y="0"/>
+          <a:ext cx="0" cy="0"/>
+          <a:chOff x="0" y="0"/>
+          <a:chExt cx="0" cy="0"/>
+        </a:xfrm>
+      </p:grpSpPr>
+      <p:sp>
+        <p:nvSpPr>
+          <p:cNvPr id="17" name="Title 16">
+            <a:extLst>
+              <a:ext uri="{FF2B5EF4-FFF2-40B4-BE49-F238E27FC236}">
+                <a16:creationId xmlns:a16="http://schemas.microsoft.com/office/drawing/2014/main" id="{1982BDB9-53CC-6E33-BFA1-E77B748C5B4C}"/>
+              </a:ext>
+            </a:extLst>
+          </p:cNvPr>
+          <p:cNvSpPr>
+            <a:spLocks noGrp="1"/>
+          </p:cNvSpPr>
+          <p:nvPr>
+            <p:ph type="title"/>
+          </p:nvPr>
+        </p:nvSpPr>
+        <p:spPr/>
+        <p:txBody>
+          <a:bodyPr/>
+          <a:lstStyle/>
+          <a:p>
+            <a:r>
+              <a:rPr lang="en-US" dirty="0">
+                <a:solidFill>
+                  <a:schemeClr val="bg2"/>
+                </a:solidFill>
+                <a:ea typeface="+mj-lt"/>
+                <a:cs typeface="+mj-lt"/>
+              </a:rPr>
+              <a:t>Hands-On #2 </a:t>
+            </a:r>
+            <a:r>
+              <a:rPr lang="en-US" dirty="0">
+                <a:solidFill>
+                  <a:schemeClr val="bg2"/>
+                </a:solidFill>
+                <a:cs typeface="Arial"/>
+              </a:rPr>
+              <a:t>:</a:t>
+            </a:r>
+            <a:endParaRPr lang="en-US" dirty="0">
+              <a:solidFill>
+                <a:schemeClr val="bg2"/>
+              </a:solidFill>
+            </a:endParaRPr>
+          </a:p>
+        </p:txBody>
+      </p:sp>
+      <p:sp>
+        <p:nvSpPr>
+          <p:cNvPr id="18" name="Content Placeholder 17">
+            <a:extLst>
+              <a:ext uri="{FF2B5EF4-FFF2-40B4-BE49-F238E27FC236}">
+                <a16:creationId xmlns:a16="http://schemas.microsoft.com/office/drawing/2014/main" id="{E61EE7BA-A217-8AB4-0016-9BA3B9D7F22A}"/>
+              </a:ext>
+            </a:extLst>
+          </p:cNvPr>
+          <p:cNvSpPr>
+            <a:spLocks noGrp="1"/>
+          </p:cNvSpPr>
+          <p:nvPr>
+            <p:ph idx="1"/>
+          </p:nvPr>
+        </p:nvSpPr>
+        <p:spPr>
+          <a:xfrm>
+            <a:off x="548640" y="1679025"/>
+            <a:ext cx="10710239" cy="4493173"/>
+          </a:xfrm>
+        </p:spPr>
+        <p:txBody>
+          <a:bodyPr vert="horz" lIns="0" tIns="0" rIns="0" bIns="0" spcCol="365760" rtlCol="0" anchor="t">
+            <a:noAutofit/>
+          </a:bodyPr>
+          <a:lstStyle/>
+          <a:p>
+            <a:r>
+              <a:rPr lang="en-US" sz="2800" dirty="0">
+                <a:solidFill>
+                  <a:schemeClr val="bg2"/>
+                </a:solidFill>
+                <a:ea typeface="+mn-lt"/>
+                <a:cs typeface="+mn-lt"/>
+              </a:rPr>
+              <a:t>Create a local folder and then initialize it as a git repository</a:t>
+            </a:r>
+          </a:p>
+          <a:p>
+            <a:pPr lvl="1"/>
+            <a:r>
+              <a:rPr lang="en-US" sz="2800" dirty="0">
+                <a:solidFill>
+                  <a:schemeClr val="bg2"/>
+                </a:solidFill>
+                <a:ea typeface="+mn-lt"/>
+                <a:cs typeface="+mn-lt"/>
+              </a:rPr>
+              <a:t>Add an arbitrary code file</a:t>
+            </a:r>
+          </a:p>
+          <a:p>
+            <a:r>
+              <a:rPr lang="en-US" sz="2800" dirty="0">
+                <a:solidFill>
+                  <a:schemeClr val="bg2"/>
+                </a:solidFill>
+                <a:ea typeface="+mn-lt"/>
+                <a:cs typeface="+mn-lt"/>
+              </a:rPr>
+              <a:t>Create a remote repository on GitHub</a:t>
+            </a:r>
+          </a:p>
+          <a:p>
+            <a:r>
+              <a:rPr lang="en-US" sz="2800" dirty="0">
+                <a:solidFill>
+                  <a:schemeClr val="bg2"/>
+                </a:solidFill>
+                <a:ea typeface="+mn-lt"/>
+                <a:cs typeface="+mn-lt"/>
+              </a:rPr>
+              <a:t>Push/pull from your local repository to the remote repository</a:t>
+            </a:r>
+            <a:endParaRPr lang="en-US" sz="2800" dirty="0">
+              <a:solidFill>
+                <a:schemeClr val="bg2"/>
+              </a:solidFill>
+              <a:cs typeface="Arial"/>
+            </a:endParaRPr>
+          </a:p>
+          <a:p>
+            <a:pPr marL="0" indent="0">
+              <a:buNone/>
+            </a:pPr>
+            <a:endParaRPr lang="en-US" sz="2800" dirty="0">
+              <a:solidFill>
+                <a:schemeClr val="bg2"/>
+              </a:solidFill>
+              <a:cs typeface="Arial"/>
+            </a:endParaRPr>
+          </a:p>
+          <a:p>
+            <a:endParaRPr lang="en-US" sz="2800" dirty="0">
+              <a:solidFill>
+                <a:schemeClr val="bg2"/>
+              </a:solidFill>
+              <a:cs typeface="Arial"/>
+            </a:endParaRPr>
+          </a:p>
+          <a:p>
+            <a:endParaRPr lang="en-US" sz="2800" dirty="0">
+              <a:solidFill>
+                <a:schemeClr val="bg2"/>
+              </a:solidFill>
+              <a:cs typeface="Arial"/>
+            </a:endParaRPr>
+          </a:p>
+          <a:p>
+            <a:endParaRPr lang="en-US" sz="2800" dirty="0">
+              <a:solidFill>
+                <a:schemeClr val="bg2"/>
+              </a:solidFill>
+              <a:cs typeface="Arial"/>
+            </a:endParaRPr>
+          </a:p>
+        </p:txBody>
+      </p:sp>
+      <p:sp>
+        <p:nvSpPr>
+          <p:cNvPr id="2" name="Date Placeholder 1">
+            <a:extLst>
+              <a:ext uri="{FF2B5EF4-FFF2-40B4-BE49-F238E27FC236}">
+                <a16:creationId xmlns:a16="http://schemas.microsoft.com/office/drawing/2014/main" id="{2758AD4D-39E6-5CEB-9826-5908B29BC915}"/>
+              </a:ext>
+            </a:extLst>
+          </p:cNvPr>
+          <p:cNvSpPr>
+            <a:spLocks noGrp="1"/>
+          </p:cNvSpPr>
+          <p:nvPr>
+            <p:ph type="dt" sz="half" idx="10"/>
+          </p:nvPr>
+        </p:nvSpPr>
+        <p:spPr/>
+        <p:txBody>
+          <a:bodyPr/>
+          <a:lstStyle/>
+          <a:p>
+            <a:fld id="{6DDC931E-8CBE-4A3F-A034-9B6122C6DCDB}" type="datetime3">
+              <a:rPr lang="en-US" smtClean="0"/>
+              <a:t>5 January 2026</a:t>
+            </a:fld>
+            <a:endParaRPr lang="en-US"/>
+          </a:p>
+        </p:txBody>
+      </p:sp>
+      <p:sp>
+        <p:nvSpPr>
+          <p:cNvPr id="3" name="Slide Number Placeholder 2">
+            <a:extLst>
+              <a:ext uri="{FF2B5EF4-FFF2-40B4-BE49-F238E27FC236}">
+                <a16:creationId xmlns:a16="http://schemas.microsoft.com/office/drawing/2014/main" id="{2C5C461E-6770-3B8B-ED0A-BE3FD6CB9723}"/>
+              </a:ext>
+            </a:extLst>
+          </p:cNvPr>
+          <p:cNvSpPr>
+            <a:spLocks noGrp="1"/>
+          </p:cNvSpPr>
+          <p:nvPr>
+            <p:ph type="sldNum" sz="quarter" idx="11"/>
+          </p:nvPr>
+        </p:nvSpPr>
+        <p:spPr/>
+        <p:txBody>
+          <a:bodyPr/>
+          <a:lstStyle/>
+          <a:p>
+            <a:fld id="{64E5BE4B-2FBF-4174-9E62-85FAD1CB43A6}" type="slidenum">
+              <a:rPr lang="en-US" smtClean="0"/>
+              <a:pPr/>
+              <a:t>12</a:t>
+            </a:fld>
+            <a:endParaRPr lang="en-US"/>
+          </a:p>
+        </p:txBody>
+      </p:sp>
+    </p:spTree>
+    <p:extLst>
+      <p:ext uri="{BB962C8B-B14F-4D97-AF65-F5344CB8AC3E}">
+        <p14:creationId xmlns:p14="http://schemas.microsoft.com/office/powerpoint/2010/main" val="2648320954"/>
+      </p:ext>
+    </p:extLst>
+  </p:cSld>
+  <p:clrMapOvr>
+    <a:masterClrMapping/>
+  </p:clrMapOvr>
+</p:sld>
+</file>
+
+<file path=ppt/slides/slide13.xml><?xml version="1.0" encoding="utf-8"?>
+<p:sld xmlns:a="http://schemas.openxmlformats.org/drawingml/2006/main" xmlns:r="http://schemas.openxmlformats.org/officeDocument/2006/relationships" xmlns:p="http://schemas.openxmlformats.org/presentationml/2006/main">
+  <p:cSld>
+    <p:spTree>
+      <p:nvGrpSpPr>
+        <p:cNvPr id="1" name="">
+          <a:extLst>
+            <a:ext uri="{FF2B5EF4-FFF2-40B4-BE49-F238E27FC236}">
+              <a16:creationId xmlns:a16="http://schemas.microsoft.com/office/drawing/2014/main" id="{4707867D-D65D-BCBB-EF1A-0964356FFF8D}"/>
+            </a:ext>
+          </a:extLst>
+        </p:cNvPr>
+        <p:cNvGrpSpPr/>
+        <p:nvPr/>
+      </p:nvGrpSpPr>
+      <p:grpSpPr>
+        <a:xfrm>
+          <a:off x="0" y="0"/>
+          <a:ext cx="0" cy="0"/>
+          <a:chOff x="0" y="0"/>
+          <a:chExt cx="0" cy="0"/>
+        </a:xfrm>
+      </p:grpSpPr>
+      <p:sp>
+        <p:nvSpPr>
+          <p:cNvPr id="17" name="Title 16">
+            <a:extLst>
+              <a:ext uri="{FF2B5EF4-FFF2-40B4-BE49-F238E27FC236}">
+                <a16:creationId xmlns:a16="http://schemas.microsoft.com/office/drawing/2014/main" id="{1F1AB85E-C53D-8459-8B32-445A413C9F77}"/>
+              </a:ext>
+            </a:extLst>
+          </p:cNvPr>
+          <p:cNvSpPr>
+            <a:spLocks noGrp="1"/>
+          </p:cNvSpPr>
+          <p:nvPr>
+            <p:ph type="title"/>
+          </p:nvPr>
+        </p:nvSpPr>
+        <p:spPr/>
+        <p:txBody>
+          <a:bodyPr/>
+          <a:lstStyle/>
+          <a:p>
+            <a:r>
+              <a:rPr lang="en-US" dirty="0">
+                <a:solidFill>
+                  <a:schemeClr val="bg2"/>
+                </a:solidFill>
+                <a:cs typeface="Arial"/>
+              </a:rPr>
+              <a:t>Questions?</a:t>
+            </a:r>
+          </a:p>
+        </p:txBody>
+      </p:sp>
+      <p:sp>
+        <p:nvSpPr>
+          <p:cNvPr id="18" name="Content Placeholder 17">
+            <a:extLst>
+              <a:ext uri="{FF2B5EF4-FFF2-40B4-BE49-F238E27FC236}">
+                <a16:creationId xmlns:a16="http://schemas.microsoft.com/office/drawing/2014/main" id="{EEBE3687-1079-29A1-5F60-78EF01A75435}"/>
+              </a:ext>
+            </a:extLst>
+          </p:cNvPr>
+          <p:cNvSpPr>
+            <a:spLocks noGrp="1"/>
+          </p:cNvSpPr>
+          <p:nvPr>
+            <p:ph idx="1"/>
+          </p:nvPr>
+        </p:nvSpPr>
+        <p:spPr/>
+        <p:txBody>
+          <a:bodyPr/>
+          <a:lstStyle/>
+          <a:p>
+            <a:endParaRPr lang="en-US"/>
+          </a:p>
+        </p:txBody>
+      </p:sp>
+      <p:sp>
+        <p:nvSpPr>
+          <p:cNvPr id="2" name="Date Placeholder 1">
+            <a:extLst>
+              <a:ext uri="{FF2B5EF4-FFF2-40B4-BE49-F238E27FC236}">
+                <a16:creationId xmlns:a16="http://schemas.microsoft.com/office/drawing/2014/main" id="{BC2E9B1C-9102-BB1A-C3D2-929D5F5F2CAE}"/>
+              </a:ext>
+            </a:extLst>
+          </p:cNvPr>
+          <p:cNvSpPr>
+            <a:spLocks noGrp="1"/>
+          </p:cNvSpPr>
+          <p:nvPr>
+            <p:ph type="dt" sz="half" idx="10"/>
+          </p:nvPr>
+        </p:nvSpPr>
+        <p:spPr/>
+        <p:txBody>
+          <a:bodyPr/>
+          <a:lstStyle/>
+          <a:p>
+            <a:fld id="{6DDC931E-8CBE-4A3F-A034-9B6122C6DCDB}" type="datetime3">
+              <a:rPr lang="en-US" smtClean="0"/>
+              <a:t>5 January 2026</a:t>
+            </a:fld>
+            <a:endParaRPr lang="en-US"/>
+          </a:p>
+        </p:txBody>
+      </p:sp>
+      <p:sp>
+        <p:nvSpPr>
+          <p:cNvPr id="3" name="Slide Number Placeholder 2">
+            <a:extLst>
+              <a:ext uri="{FF2B5EF4-FFF2-40B4-BE49-F238E27FC236}">
+                <a16:creationId xmlns:a16="http://schemas.microsoft.com/office/drawing/2014/main" id="{1F1E089D-CD33-B5CC-5511-75444B3AB940}"/>
+              </a:ext>
+            </a:extLst>
+          </p:cNvPr>
+          <p:cNvSpPr>
+            <a:spLocks noGrp="1"/>
+          </p:cNvSpPr>
+          <p:nvPr>
+            <p:ph type="sldNum" sz="quarter" idx="11"/>
+          </p:nvPr>
+        </p:nvSpPr>
+        <p:spPr/>
+        <p:txBody>
+          <a:bodyPr/>
+          <a:lstStyle/>
+          <a:p>
+            <a:fld id="{64E5BE4B-2FBF-4174-9E62-85FAD1CB43A6}" type="slidenum">
+              <a:rPr lang="en-US" smtClean="0"/>
+              <a:pPr/>
+              <a:t>13</a:t>
+            </a:fld>
+            <a:endParaRPr lang="en-US"/>
+          </a:p>
+        </p:txBody>
+      </p:sp>
+    </p:spTree>
+    <p:extLst>
+      <p:ext uri="{BB962C8B-B14F-4D97-AF65-F5344CB8AC3E}">
+        <p14:creationId xmlns:p14="http://schemas.microsoft.com/office/powerpoint/2010/main" val="2955603504"/>
+      </p:ext>
+    </p:extLst>
+  </p:cSld>
+  <p:clrMapOvr>
+    <a:masterClrMapping/>
+  </p:clrMapOvr>
+</p:sld>
+</file>
+
+<file path=ppt/slides/slide14.xml><?xml version="1.0" encoding="utf-8"?>
+<p:sld xmlns:a="http://schemas.openxmlformats.org/drawingml/2006/main" xmlns:r="http://schemas.openxmlformats.org/officeDocument/2006/relationships" xmlns:p="http://schemas.openxmlformats.org/presentationml/2006/main">
+  <p:cSld>
+    <p:spTree>
+      <p:nvGrpSpPr>
+        <p:cNvPr id="1" name="">
+          <a:extLst>
+            <a:ext uri="{FF2B5EF4-FFF2-40B4-BE49-F238E27FC236}">
+              <a16:creationId xmlns:a16="http://schemas.microsoft.com/office/drawing/2014/main" id="{BABE2C0A-85D6-ED0F-EB89-C15A78E0DE44}"/>
+            </a:ext>
+          </a:extLst>
+        </p:cNvPr>
+        <p:cNvGrpSpPr/>
+        <p:nvPr/>
+      </p:nvGrpSpPr>
+      <p:grpSpPr>
+        <a:xfrm>
+          <a:off x="0" y="0"/>
+          <a:ext cx="0" cy="0"/>
+          <a:chOff x="0" y="0"/>
+          <a:chExt cx="0" cy="0"/>
+        </a:xfrm>
+      </p:grpSpPr>
+      <p:sp>
+        <p:nvSpPr>
+          <p:cNvPr id="17" name="Title 16">
+            <a:extLst>
+              <a:ext uri="{FF2B5EF4-FFF2-40B4-BE49-F238E27FC236}">
+                <a16:creationId xmlns:a16="http://schemas.microsoft.com/office/drawing/2014/main" id="{FB4C8AFE-5195-E1C1-6D82-8620598BDC87}"/>
+              </a:ext>
+            </a:extLst>
+          </p:cNvPr>
+          <p:cNvSpPr>
+            <a:spLocks noGrp="1"/>
+          </p:cNvSpPr>
+          <p:nvPr>
+            <p:ph type="title"/>
+          </p:nvPr>
+        </p:nvSpPr>
+        <p:spPr/>
+        <p:txBody>
+          <a:bodyPr/>
+          <a:lstStyle/>
+          <a:p>
+            <a:r>
+              <a:rPr lang="en-US" dirty="0">
+                <a:solidFill>
+                  <a:schemeClr val="bg2"/>
+                </a:solidFill>
+                <a:ea typeface="+mj-lt"/>
+                <a:cs typeface="+mj-lt"/>
+              </a:rPr>
+              <a:t>Hands-On #3 </a:t>
+            </a:r>
+            <a:r>
+              <a:rPr lang="en-US" dirty="0">
+                <a:solidFill>
+                  <a:schemeClr val="bg2"/>
+                </a:solidFill>
+                <a:cs typeface="Arial"/>
+              </a:rPr>
+              <a:t>:</a:t>
+            </a:r>
+            <a:endParaRPr lang="en-US" dirty="0">
+              <a:solidFill>
+                <a:schemeClr val="bg2"/>
+              </a:solidFill>
+            </a:endParaRPr>
+          </a:p>
+        </p:txBody>
+      </p:sp>
+      <p:sp>
+        <p:nvSpPr>
+          <p:cNvPr id="18" name="Content Placeholder 17">
+            <a:extLst>
+              <a:ext uri="{FF2B5EF4-FFF2-40B4-BE49-F238E27FC236}">
+                <a16:creationId xmlns:a16="http://schemas.microsoft.com/office/drawing/2014/main" id="{7B653C2C-B832-5D9A-DDF8-5786B692DB78}"/>
+              </a:ext>
+            </a:extLst>
+          </p:cNvPr>
+          <p:cNvSpPr>
+            <a:spLocks noGrp="1"/>
+          </p:cNvSpPr>
+          <p:nvPr>
+            <p:ph idx="1"/>
+          </p:nvPr>
+        </p:nvSpPr>
+        <p:spPr>
+          <a:xfrm>
+            <a:off x="548640" y="1679025"/>
+            <a:ext cx="10710239" cy="4493173"/>
+          </a:xfrm>
+        </p:spPr>
+        <p:txBody>
+          <a:bodyPr vert="horz" lIns="0" tIns="0" rIns="0" bIns="0" spcCol="365760" rtlCol="0" anchor="t">
+            <a:noAutofit/>
+          </a:bodyPr>
+          <a:lstStyle/>
+          <a:p>
+            <a:r>
+              <a:rPr lang="en-US" sz="2800" dirty="0">
+                <a:solidFill>
+                  <a:schemeClr val="bg2"/>
+                </a:solidFill>
+                <a:ea typeface="+mn-lt"/>
+                <a:cs typeface="+mn-lt"/>
+              </a:rPr>
+              <a:t>Create a remote repository and add an arbitrary file</a:t>
+            </a:r>
+          </a:p>
+          <a:p>
+            <a:r>
+              <a:rPr lang="en-US" sz="2800" dirty="0">
+                <a:solidFill>
+                  <a:schemeClr val="bg2"/>
+                </a:solidFill>
+                <a:ea typeface="+mn-lt"/>
+                <a:cs typeface="+mn-lt"/>
+              </a:rPr>
+              <a:t>Fork the repository</a:t>
+            </a:r>
+          </a:p>
+          <a:p>
+            <a:r>
+              <a:rPr lang="en-US" sz="2800" dirty="0">
+                <a:solidFill>
+                  <a:schemeClr val="bg2"/>
+                </a:solidFill>
+                <a:ea typeface="+mn-lt"/>
+                <a:cs typeface="+mn-lt"/>
+              </a:rPr>
+              <a:t>Clone the fork onto your local workspace</a:t>
+            </a:r>
+          </a:p>
+          <a:p>
+            <a:r>
+              <a:rPr lang="en-US" sz="2800" dirty="0">
+                <a:solidFill>
+                  <a:schemeClr val="bg2"/>
+                </a:solidFill>
+                <a:ea typeface="+mn-lt"/>
+                <a:cs typeface="+mn-lt"/>
+              </a:rPr>
+              <a:t>Create and commit arbitrary changes to the local repository</a:t>
+            </a:r>
+          </a:p>
+          <a:p>
+            <a:pPr lvl="1"/>
+            <a:r>
+              <a:rPr lang="en-US" sz="2800" dirty="0">
+                <a:solidFill>
+                  <a:schemeClr val="bg2"/>
+                </a:solidFill>
+                <a:ea typeface="+mn-lt"/>
+                <a:cs typeface="+mn-lt"/>
+              </a:rPr>
+              <a:t>Create several changes (commits)</a:t>
+            </a:r>
+          </a:p>
+          <a:p>
+            <a:r>
+              <a:rPr lang="en-US" sz="2800" dirty="0">
+                <a:solidFill>
+                  <a:schemeClr val="bg2"/>
+                </a:solidFill>
+                <a:ea typeface="+mn-lt"/>
+                <a:cs typeface="+mn-lt"/>
+              </a:rPr>
+              <a:t>Push your changes to your fork</a:t>
+            </a:r>
+          </a:p>
+          <a:p>
+            <a:r>
+              <a:rPr lang="en-US" sz="2800" dirty="0">
+                <a:solidFill>
+                  <a:schemeClr val="bg2"/>
+                </a:solidFill>
+                <a:ea typeface="+mn-lt"/>
+                <a:cs typeface="+mn-lt"/>
+              </a:rPr>
+              <a:t>Issue a Pull Request back to the upstream</a:t>
+            </a:r>
+          </a:p>
+          <a:p>
+            <a:endParaRPr lang="en-US" sz="2800" dirty="0">
+              <a:solidFill>
+                <a:schemeClr val="bg2"/>
+              </a:solidFill>
+              <a:cs typeface="Arial"/>
+            </a:endParaRPr>
+          </a:p>
+          <a:p>
+            <a:pPr marL="0" indent="0">
+              <a:buNone/>
+            </a:pPr>
+            <a:endParaRPr lang="en-US" sz="2800" dirty="0">
+              <a:solidFill>
+                <a:schemeClr val="bg2"/>
+              </a:solidFill>
+              <a:cs typeface="Arial"/>
+            </a:endParaRPr>
+          </a:p>
+          <a:p>
+            <a:endParaRPr lang="en-US" sz="2800" dirty="0">
+              <a:solidFill>
+                <a:schemeClr val="bg2"/>
+              </a:solidFill>
+              <a:cs typeface="Arial"/>
+            </a:endParaRPr>
+          </a:p>
+          <a:p>
+            <a:endParaRPr lang="en-US" sz="2800" dirty="0">
+              <a:solidFill>
+                <a:schemeClr val="bg2"/>
+              </a:solidFill>
+              <a:cs typeface="Arial"/>
+            </a:endParaRPr>
+          </a:p>
+          <a:p>
+            <a:endParaRPr lang="en-US" sz="2800" dirty="0">
+              <a:solidFill>
+                <a:schemeClr val="bg2"/>
+              </a:solidFill>
+              <a:cs typeface="Arial"/>
+            </a:endParaRPr>
+          </a:p>
+        </p:txBody>
+      </p:sp>
+      <p:sp>
+        <p:nvSpPr>
+          <p:cNvPr id="2" name="Date Placeholder 1">
+            <a:extLst>
+              <a:ext uri="{FF2B5EF4-FFF2-40B4-BE49-F238E27FC236}">
+                <a16:creationId xmlns:a16="http://schemas.microsoft.com/office/drawing/2014/main" id="{7BB8185D-4BA3-612E-5594-9C577CDD32A6}"/>
+              </a:ext>
+            </a:extLst>
+          </p:cNvPr>
+          <p:cNvSpPr>
+            <a:spLocks noGrp="1"/>
+          </p:cNvSpPr>
+          <p:nvPr>
+            <p:ph type="dt" sz="half" idx="10"/>
+          </p:nvPr>
+        </p:nvSpPr>
+        <p:spPr/>
+        <p:txBody>
+          <a:bodyPr/>
+          <a:lstStyle/>
+          <a:p>
+            <a:fld id="{6DDC931E-8CBE-4A3F-A034-9B6122C6DCDB}" type="datetime3">
+              <a:rPr lang="en-US" smtClean="0"/>
+              <a:t>5 January 2026</a:t>
+            </a:fld>
+            <a:endParaRPr lang="en-US"/>
+          </a:p>
+        </p:txBody>
+      </p:sp>
+      <p:sp>
+        <p:nvSpPr>
+          <p:cNvPr id="3" name="Slide Number Placeholder 2">
+            <a:extLst>
+              <a:ext uri="{FF2B5EF4-FFF2-40B4-BE49-F238E27FC236}">
+                <a16:creationId xmlns:a16="http://schemas.microsoft.com/office/drawing/2014/main" id="{CB8DD1D4-82AB-144D-5CE8-91B2FDA9164A}"/>
+              </a:ext>
+            </a:extLst>
+          </p:cNvPr>
+          <p:cNvSpPr>
+            <a:spLocks noGrp="1"/>
+          </p:cNvSpPr>
+          <p:nvPr>
+            <p:ph type="sldNum" sz="quarter" idx="11"/>
+          </p:nvPr>
+        </p:nvSpPr>
+        <p:spPr/>
+        <p:txBody>
+          <a:bodyPr/>
+          <a:lstStyle/>
+          <a:p>
+            <a:fld id="{64E5BE4B-2FBF-4174-9E62-85FAD1CB43A6}" type="slidenum">
+              <a:rPr lang="en-US" smtClean="0"/>
+              <a:pPr/>
+              <a:t>14</a:t>
+            </a:fld>
+            <a:endParaRPr lang="en-US"/>
+          </a:p>
+        </p:txBody>
+      </p:sp>
+    </p:spTree>
+    <p:extLst>
+      <p:ext uri="{BB962C8B-B14F-4D97-AF65-F5344CB8AC3E}">
+        <p14:creationId xmlns:p14="http://schemas.microsoft.com/office/powerpoint/2010/main" val="3614620721"/>
       </p:ext>
     </p:extLst>
   </p:cSld>
@@ -20683,7 +22249,7 @@
           <a:p>
             <a:fld id="{6DDC931E-8CBE-4A3F-A034-9B6122C6DCDB}" type="datetime3">
               <a:rPr lang="en-US" smtClean="0"/>
-              <a:t>22 December 2025</a:t>
+              <a:t>5 January 2026</a:t>
             </a:fld>
             <a:endParaRPr lang="en-US"/>
           </a:p>
@@ -20733,6 +22299,154 @@
 </file>
 
 <file path=ppt/slides/slide3.xml><?xml version="1.0" encoding="utf-8"?>
+<p:sld xmlns:a="http://schemas.openxmlformats.org/drawingml/2006/main" xmlns:r="http://schemas.openxmlformats.org/officeDocument/2006/relationships" xmlns:p="http://schemas.openxmlformats.org/presentationml/2006/main">
+  <p:cSld>
+    <p:spTree>
+      <p:nvGrpSpPr>
+        <p:cNvPr id="1" name=""/>
+        <p:cNvGrpSpPr/>
+        <p:nvPr/>
+      </p:nvGrpSpPr>
+      <p:grpSpPr>
+        <a:xfrm>
+          <a:off x="0" y="0"/>
+          <a:ext cx="0" cy="0"/>
+          <a:chOff x="0" y="0"/>
+          <a:chExt cx="0" cy="0"/>
+        </a:xfrm>
+      </p:grpSpPr>
+      <p:sp>
+        <p:nvSpPr>
+          <p:cNvPr id="2" name="Title 1">
+            <a:extLst>
+              <a:ext uri="{FF2B5EF4-FFF2-40B4-BE49-F238E27FC236}">
+                <a16:creationId xmlns:a16="http://schemas.microsoft.com/office/drawing/2014/main" id="{63799CC7-3171-00C7-B289-E2931B963A36}"/>
+              </a:ext>
+            </a:extLst>
+          </p:cNvPr>
+          <p:cNvSpPr>
+            <a:spLocks noGrp="1"/>
+          </p:cNvSpPr>
+          <p:nvPr>
+            <p:ph type="title"/>
+          </p:nvPr>
+        </p:nvSpPr>
+        <p:spPr/>
+        <p:txBody>
+          <a:bodyPr/>
+          <a:lstStyle/>
+          <a:p>
+            <a:r>
+              <a:rPr lang="en-US" dirty="0"/>
+              <a:t>Before we begin…</a:t>
+            </a:r>
+          </a:p>
+        </p:txBody>
+      </p:sp>
+      <p:sp>
+        <p:nvSpPr>
+          <p:cNvPr id="3" name="Content Placeholder 2">
+            <a:extLst>
+              <a:ext uri="{FF2B5EF4-FFF2-40B4-BE49-F238E27FC236}">
+                <a16:creationId xmlns:a16="http://schemas.microsoft.com/office/drawing/2014/main" id="{E4BDAE4F-691B-45B2-2FD7-BDEF16BDACEB}"/>
+              </a:ext>
+            </a:extLst>
+          </p:cNvPr>
+          <p:cNvSpPr>
+            <a:spLocks noGrp="1"/>
+          </p:cNvSpPr>
+          <p:nvPr>
+            <p:ph idx="1"/>
+          </p:nvPr>
+        </p:nvSpPr>
+        <p:spPr/>
+        <p:txBody>
+          <a:bodyPr/>
+          <a:lstStyle/>
+          <a:p>
+            <a:pPr marL="0" indent="0">
+              <a:buNone/>
+            </a:pPr>
+            <a:r>
+              <a:rPr lang="en-US" dirty="0"/>
+              <a:t>Let’s take a tour of GitHub…</a:t>
+            </a:r>
+          </a:p>
+        </p:txBody>
+      </p:sp>
+      <p:sp>
+        <p:nvSpPr>
+          <p:cNvPr id="4" name="Date Placeholder 3">
+            <a:extLst>
+              <a:ext uri="{FF2B5EF4-FFF2-40B4-BE49-F238E27FC236}">
+                <a16:creationId xmlns:a16="http://schemas.microsoft.com/office/drawing/2014/main" id="{CDD98C05-E83E-0A86-BBF6-3A75AE6BA3BC}"/>
+              </a:ext>
+            </a:extLst>
+          </p:cNvPr>
+          <p:cNvSpPr>
+            <a:spLocks noGrp="1"/>
+          </p:cNvSpPr>
+          <p:nvPr>
+            <p:ph type="dt" sz="half" idx="10"/>
+          </p:nvPr>
+        </p:nvSpPr>
+        <p:spPr/>
+        <p:txBody>
+          <a:bodyPr/>
+          <a:lstStyle/>
+          <a:p>
+            <a:fld id="{AD622D1A-DF83-41A8-85FF-04D90BF831D3}" type="datetime3">
+              <a:rPr lang="en-US" smtClean="0"/>
+              <a:t>5 January 2026</a:t>
+            </a:fld>
+            <a:endParaRPr lang="en-US"/>
+          </a:p>
+        </p:txBody>
+      </p:sp>
+      <p:sp>
+        <p:nvSpPr>
+          <p:cNvPr id="5" name="Slide Number Placeholder 4">
+            <a:extLst>
+              <a:ext uri="{FF2B5EF4-FFF2-40B4-BE49-F238E27FC236}">
+                <a16:creationId xmlns:a16="http://schemas.microsoft.com/office/drawing/2014/main" id="{A3719E30-CC68-64B5-BEAF-1C5D69EB0A53}"/>
+              </a:ext>
+            </a:extLst>
+          </p:cNvPr>
+          <p:cNvSpPr>
+            <a:spLocks noGrp="1"/>
+          </p:cNvSpPr>
+          <p:nvPr>
+            <p:ph type="sldNum" sz="quarter" idx="11"/>
+          </p:nvPr>
+        </p:nvSpPr>
+        <p:spPr/>
+        <p:txBody>
+          <a:bodyPr/>
+          <a:lstStyle/>
+          <a:p>
+            <a:fld id="{64E5BE4B-2FBF-4174-9E62-85FAD1CB43A6}" type="slidenum">
+              <a:rPr lang="en-US" smtClean="0"/>
+              <a:pPr/>
+              <a:t>3</a:t>
+            </a:fld>
+            <a:endParaRPr lang="en-US"/>
+          </a:p>
+        </p:txBody>
+      </p:sp>
+    </p:spTree>
+    <p:extLst>
+      <p:ext uri="{BB962C8B-B14F-4D97-AF65-F5344CB8AC3E}">
+        <p14:creationId xmlns:p14="http://schemas.microsoft.com/office/powerpoint/2010/main" val="3201765451"/>
+      </p:ext>
+    </p:extLst>
+  </p:cSld>
+  <p:clrMapOvr>
+    <a:masterClrMapping/>
+  </p:clrMapOvr>
+</p:sld>
+</file>
+
+<file path=ppt/slides/slide4.xml><?xml version="1.0" encoding="utf-8"?>
 <p:sld xmlns:a="http://schemas.openxmlformats.org/drawingml/2006/main" xmlns:r="http://schemas.openxmlformats.org/officeDocument/2006/relationships" xmlns:p="http://schemas.openxmlformats.org/presentationml/2006/main">
   <p:cSld>
     <p:bg>
@@ -20923,7 +22637,7 @@
           <a:p>
             <a:fld id="{6DDC931E-8CBE-4A3F-A034-9B6122C6DCDB}" type="datetime3">
               <a:rPr lang="en-US" smtClean="0"/>
-              <a:t>22 December 2025</a:t>
+              <a:t>5 January 2026</a:t>
             </a:fld>
             <a:endParaRPr lang="en-US"/>
           </a:p>
@@ -20953,7 +22667,7 @@
             <a:fld id="{64E5BE4B-2FBF-4174-9E62-85FAD1CB43A6}" type="slidenum">
               <a:rPr lang="en-US" smtClean="0"/>
               <a:pPr/>
-              <a:t>3</a:t>
+              <a:t>4</a:t>
             </a:fld>
             <a:endParaRPr lang="en-US"/>
           </a:p>
@@ -20972,7 +22686,7 @@
 </p:sld>
 </file>
 
-<file path=ppt/slides/slide4.xml><?xml version="1.0" encoding="utf-8"?>
+<file path=ppt/slides/slide5.xml><?xml version="1.0" encoding="utf-8"?>
 <p:sld xmlns:a="http://schemas.openxmlformats.org/drawingml/2006/main" xmlns:r="http://schemas.openxmlformats.org/officeDocument/2006/relationships" xmlns:p="http://schemas.openxmlformats.org/presentationml/2006/main">
   <p:cSld>
     <p:bg>
@@ -21220,7 +22934,7 @@
           <a:p>
             <a:fld id="{6DDC931E-8CBE-4A3F-A034-9B6122C6DCDB}" type="datetime3">
               <a:rPr lang="en-US" smtClean="0"/>
-              <a:t>22 December 2025</a:t>
+              <a:t>5 January 2026</a:t>
             </a:fld>
             <a:endParaRPr lang="en-US"/>
           </a:p>
@@ -21250,7 +22964,7 @@
             <a:fld id="{64E5BE4B-2FBF-4174-9E62-85FAD1CB43A6}" type="slidenum">
               <a:rPr lang="en-US" smtClean="0"/>
               <a:pPr/>
-              <a:t>4</a:t>
+              <a:t>5</a:t>
             </a:fld>
             <a:endParaRPr lang="en-US"/>
           </a:p>
@@ -21269,7 +22983,7 @@
 </p:sld>
 </file>
 
-<file path=ppt/slides/slide5.xml><?xml version="1.0" encoding="utf-8"?>
+<file path=ppt/slides/slide6.xml><?xml version="1.0" encoding="utf-8"?>
 <p:sld xmlns:a="http://schemas.openxmlformats.org/drawingml/2006/main" xmlns:r="http://schemas.openxmlformats.org/officeDocument/2006/relationships" xmlns:p="http://schemas.openxmlformats.org/presentationml/2006/main">
   <p:cSld>
     <p:bg>
@@ -21390,7 +23104,7 @@
           <a:p>
             <a:fld id="{6DDC931E-8CBE-4A3F-A034-9B6122C6DCDB}" type="datetime3">
               <a:rPr lang="en-US" smtClean="0"/>
-              <a:t>22 December 2025</a:t>
+              <a:t>5 January 2026</a:t>
             </a:fld>
             <a:endParaRPr lang="en-US"/>
           </a:p>
@@ -21420,7 +23134,7 @@
             <a:fld id="{64E5BE4B-2FBF-4174-9E62-85FAD1CB43A6}" type="slidenum">
               <a:rPr lang="en-US" smtClean="0"/>
               <a:pPr/>
-              <a:t>5</a:t>
+              <a:t>6</a:t>
             </a:fld>
             <a:endParaRPr lang="en-US"/>
           </a:p>
@@ -21469,7 +23183,7 @@
 </p:sld>
 </file>
 
-<file path=ppt/slides/slide6.xml><?xml version="1.0" encoding="utf-8"?>
+<file path=ppt/slides/slide7.xml><?xml version="1.0" encoding="utf-8"?>
 <p:sld xmlns:a="http://schemas.openxmlformats.org/drawingml/2006/main" xmlns:r="http://schemas.openxmlformats.org/officeDocument/2006/relationships" xmlns:p="http://schemas.openxmlformats.org/presentationml/2006/main">
   <p:cSld>
     <p:bg>
@@ -21588,7 +23302,7 @@
           <a:p>
             <a:fld id="{6DDC931E-8CBE-4A3F-A034-9B6122C6DCDB}" type="datetime3">
               <a:rPr lang="en-US" smtClean="0"/>
-              <a:t>22 December 2025</a:t>
+              <a:t>5 January 2026</a:t>
             </a:fld>
             <a:endParaRPr lang="en-US"/>
           </a:p>
@@ -21618,7 +23332,7 @@
             <a:fld id="{64E5BE4B-2FBF-4174-9E62-85FAD1CB43A6}" type="slidenum">
               <a:rPr lang="en-US" smtClean="0"/>
               <a:pPr/>
-              <a:t>6</a:t>
+              <a:t>7</a:t>
             </a:fld>
             <a:endParaRPr lang="en-US"/>
           </a:p>
@@ -21637,7 +23351,7 @@
 </p:sld>
 </file>
 
-<file path=ppt/slides/slide7.xml><?xml version="1.0" encoding="utf-8"?>
+<file path=ppt/slides/slide8.xml><?xml version="1.0" encoding="utf-8"?>
 <p:sld xmlns:a="http://schemas.openxmlformats.org/drawingml/2006/main" xmlns:r="http://schemas.openxmlformats.org/officeDocument/2006/relationships" xmlns:p="http://schemas.openxmlformats.org/presentationml/2006/main">
   <p:cSld>
     <p:bg>
@@ -21850,7 +23564,7 @@
           <a:p>
             <a:fld id="{6DDC931E-8CBE-4A3F-A034-9B6122C6DCDB}" type="datetime3">
               <a:rPr lang="en-US" smtClean="0"/>
-              <a:t>22 December 2025</a:t>
+              <a:t>5 January 2026</a:t>
             </a:fld>
             <a:endParaRPr lang="en-US"/>
           </a:p>
@@ -21880,7 +23594,7 @@
             <a:fld id="{64E5BE4B-2FBF-4174-9E62-85FAD1CB43A6}" type="slidenum">
               <a:rPr lang="en-US" smtClean="0"/>
               <a:pPr/>
-              <a:t>7</a:t>
+              <a:t>8</a:t>
             </a:fld>
             <a:endParaRPr lang="en-US"/>
           </a:p>
@@ -21899,7 +23613,7 @@
 </p:sld>
 </file>
 
-<file path=ppt/slides/slide8.xml><?xml version="1.0" encoding="utf-8"?>
+<file path=ppt/slides/slide9.xml><?xml version="1.0" encoding="utf-8"?>
 <p:sld xmlns:a="http://schemas.openxmlformats.org/drawingml/2006/main" xmlns:r="http://schemas.openxmlformats.org/officeDocument/2006/relationships" xmlns:p="http://schemas.openxmlformats.org/presentationml/2006/main">
   <p:cSld>
     <p:bg>
@@ -22122,7 +23836,7 @@
           <a:p>
             <a:fld id="{AD622D1A-DF83-41A8-85FF-04D90BF831D3}" type="datetime3">
               <a:rPr lang="en-US" smtClean="0"/>
-              <a:t>22 December 2025</a:t>
+              <a:t>5 January 2026</a:t>
             </a:fld>
             <a:endParaRPr lang="en-US"/>
           </a:p>
@@ -22134,272 +23848,6 @@
             <a:extLst>
               <a:ext uri="{FF2B5EF4-FFF2-40B4-BE49-F238E27FC236}">
                 <a16:creationId xmlns:a16="http://schemas.microsoft.com/office/drawing/2014/main" id="{94E1A057-81B7-19AA-B0FD-7BF9FCA712CF}"/>
-              </a:ext>
-            </a:extLst>
-          </p:cNvPr>
-          <p:cNvSpPr>
-            <a:spLocks noGrp="1"/>
-          </p:cNvSpPr>
-          <p:nvPr>
-            <p:ph type="sldNum" sz="quarter" idx="11"/>
-          </p:nvPr>
-        </p:nvSpPr>
-        <p:spPr/>
-        <p:txBody>
-          <a:bodyPr/>
-          <a:lstStyle/>
-          <a:p>
-            <a:fld id="{64E5BE4B-2FBF-4174-9E62-85FAD1CB43A6}" type="slidenum">
-              <a:rPr lang="en-US" smtClean="0"/>
-              <a:pPr/>
-              <a:t>8</a:t>
-            </a:fld>
-            <a:endParaRPr lang="en-US"/>
-          </a:p>
-        </p:txBody>
-      </p:sp>
-    </p:spTree>
-    <p:extLst>
-      <p:ext uri="{BB962C8B-B14F-4D97-AF65-F5344CB8AC3E}">
-        <p14:creationId xmlns:p14="http://schemas.microsoft.com/office/powerpoint/2010/main" val="1685140285"/>
-      </p:ext>
-    </p:extLst>
-  </p:cSld>
-  <p:clrMapOvr>
-    <a:masterClrMapping/>
-  </p:clrMapOvr>
-</p:sld>
-</file>
-
-<file path=ppt/slides/slide9.xml><?xml version="1.0" encoding="utf-8"?>
-<p:sld xmlns:a="http://schemas.openxmlformats.org/drawingml/2006/main" xmlns:r="http://schemas.openxmlformats.org/officeDocument/2006/relationships" xmlns:p="http://schemas.openxmlformats.org/presentationml/2006/main">
-  <p:cSld>
-    <p:bg>
-      <p:bgPr>
-        <a:solidFill>
-          <a:schemeClr val="tx1"/>
-        </a:solidFill>
-        <a:effectLst/>
-      </p:bgPr>
-    </p:bg>
-    <p:spTree>
-      <p:nvGrpSpPr>
-        <p:cNvPr id="1" name="">
-          <a:extLst>
-            <a:ext uri="{FF2B5EF4-FFF2-40B4-BE49-F238E27FC236}">
-              <a16:creationId xmlns:a16="http://schemas.microsoft.com/office/drawing/2014/main" id="{B9358F57-D057-5E4D-0C64-48BD653DEF10}"/>
-            </a:ext>
-          </a:extLst>
-        </p:cNvPr>
-        <p:cNvGrpSpPr/>
-        <p:nvPr/>
-      </p:nvGrpSpPr>
-      <p:grpSpPr>
-        <a:xfrm>
-          <a:off x="0" y="0"/>
-          <a:ext cx="0" cy="0"/>
-          <a:chOff x="0" y="0"/>
-          <a:chExt cx="0" cy="0"/>
-        </a:xfrm>
-      </p:grpSpPr>
-      <p:sp>
-        <p:nvSpPr>
-          <p:cNvPr id="17" name="Title 16">
-            <a:extLst>
-              <a:ext uri="{FF2B5EF4-FFF2-40B4-BE49-F238E27FC236}">
-                <a16:creationId xmlns:a16="http://schemas.microsoft.com/office/drawing/2014/main" id="{CB4F9626-8DB8-38BD-A0EF-1D8574BC9D22}"/>
-              </a:ext>
-            </a:extLst>
-          </p:cNvPr>
-          <p:cNvSpPr>
-            <a:spLocks noGrp="1"/>
-          </p:cNvSpPr>
-          <p:nvPr>
-            <p:ph type="title"/>
-          </p:nvPr>
-        </p:nvSpPr>
-        <p:spPr/>
-        <p:txBody>
-          <a:bodyPr/>
-          <a:lstStyle/>
-          <a:p>
-            <a:r>
-              <a:rPr lang="en-US" dirty="0">
-                <a:solidFill>
-                  <a:schemeClr val="bg2"/>
-                </a:solidFill>
-                <a:ea typeface="+mj-lt"/>
-                <a:cs typeface="+mj-lt"/>
-              </a:rPr>
-              <a:t>Hands-On #1 </a:t>
-            </a:r>
-            <a:r>
-              <a:rPr lang="en-US" dirty="0">
-                <a:solidFill>
-                  <a:schemeClr val="bg2"/>
-                </a:solidFill>
-                <a:cs typeface="Arial"/>
-              </a:rPr>
-              <a:t>:</a:t>
-            </a:r>
-            <a:endParaRPr lang="en-US" dirty="0">
-              <a:solidFill>
-                <a:schemeClr val="bg2"/>
-              </a:solidFill>
-            </a:endParaRPr>
-          </a:p>
-        </p:txBody>
-      </p:sp>
-      <p:sp>
-        <p:nvSpPr>
-          <p:cNvPr id="18" name="Content Placeholder 17">
-            <a:extLst>
-              <a:ext uri="{FF2B5EF4-FFF2-40B4-BE49-F238E27FC236}">
-                <a16:creationId xmlns:a16="http://schemas.microsoft.com/office/drawing/2014/main" id="{B0CFAD0C-5EE1-5F79-E38C-2C75451C08DE}"/>
-              </a:ext>
-            </a:extLst>
-          </p:cNvPr>
-          <p:cNvSpPr>
-            <a:spLocks noGrp="1"/>
-          </p:cNvSpPr>
-          <p:nvPr>
-            <p:ph idx="1"/>
-          </p:nvPr>
-        </p:nvSpPr>
-        <p:spPr>
-          <a:xfrm>
-            <a:off x="548640" y="1679025"/>
-            <a:ext cx="10710239" cy="4493173"/>
-          </a:xfrm>
-        </p:spPr>
-        <p:txBody>
-          <a:bodyPr vert="horz" lIns="0" tIns="0" rIns="0" bIns="0" spcCol="365760" rtlCol="0" anchor="t">
-            <a:noAutofit/>
-          </a:bodyPr>
-          <a:lstStyle/>
-          <a:p>
-            <a:r>
-              <a:rPr lang="en-US" sz="2800" dirty="0">
-                <a:solidFill>
-                  <a:schemeClr val="bg2"/>
-                </a:solidFill>
-                <a:ea typeface="+mn-lt"/>
-                <a:cs typeface="+mn-lt"/>
-              </a:rPr>
-              <a:t>Inspect git remotes </a:t>
-            </a:r>
-            <a:endParaRPr lang="en-US" sz="2800" dirty="0">
-              <a:solidFill>
-                <a:schemeClr val="bg2"/>
-              </a:solidFill>
-              <a:cs typeface="Arial"/>
-            </a:endParaRPr>
-          </a:p>
-          <a:p>
-            <a:r>
-              <a:rPr lang="en-US" sz="2800" dirty="0">
-                <a:solidFill>
-                  <a:schemeClr val="bg2"/>
-                </a:solidFill>
-                <a:ea typeface="+mn-lt"/>
-                <a:cs typeface="+mn-lt"/>
-              </a:rPr>
-              <a:t>Push/pull from a remote repository </a:t>
-            </a:r>
-            <a:endParaRPr lang="en-US" sz="2800" dirty="0">
-              <a:solidFill>
-                <a:schemeClr val="bg2"/>
-              </a:solidFill>
-              <a:cs typeface="Arial"/>
-            </a:endParaRPr>
-          </a:p>
-          <a:p>
-            <a:r>
-              <a:rPr lang="en-US" sz="2800" dirty="0">
-                <a:solidFill>
-                  <a:schemeClr val="bg2"/>
-                </a:solidFill>
-                <a:ea typeface="+mn-lt"/>
-                <a:cs typeface="+mn-lt"/>
-              </a:rPr>
-              <a:t>Fork a remote repository and issue a pull request </a:t>
-            </a:r>
-            <a:endParaRPr lang="en-US" sz="2800" dirty="0">
-              <a:solidFill>
-                <a:schemeClr val="bg2"/>
-              </a:solidFill>
-              <a:cs typeface="Arial"/>
-            </a:endParaRPr>
-          </a:p>
-          <a:p>
-            <a:endParaRPr lang="en-US" sz="2800" dirty="0">
-              <a:solidFill>
-                <a:schemeClr val="bg2"/>
-              </a:solidFill>
-              <a:cs typeface="Arial"/>
-            </a:endParaRPr>
-          </a:p>
-          <a:p>
-            <a:endParaRPr lang="en-US" sz="2800" dirty="0">
-              <a:solidFill>
-                <a:schemeClr val="bg2"/>
-              </a:solidFill>
-              <a:cs typeface="Arial"/>
-            </a:endParaRPr>
-          </a:p>
-          <a:p>
-            <a:endParaRPr lang="en-US" sz="2800" dirty="0">
-              <a:solidFill>
-                <a:schemeClr val="bg2"/>
-              </a:solidFill>
-              <a:cs typeface="Arial"/>
-            </a:endParaRPr>
-          </a:p>
-          <a:p>
-            <a:endParaRPr lang="en-US" sz="2800" dirty="0">
-              <a:solidFill>
-                <a:schemeClr val="bg2"/>
-              </a:solidFill>
-              <a:cs typeface="Arial"/>
-            </a:endParaRPr>
-          </a:p>
-        </p:txBody>
-      </p:sp>
-      <p:sp>
-        <p:nvSpPr>
-          <p:cNvPr id="2" name="Date Placeholder 1">
-            <a:extLst>
-              <a:ext uri="{FF2B5EF4-FFF2-40B4-BE49-F238E27FC236}">
-                <a16:creationId xmlns:a16="http://schemas.microsoft.com/office/drawing/2014/main" id="{B8E33109-0765-3E74-7233-0C09D380A369}"/>
-              </a:ext>
-            </a:extLst>
-          </p:cNvPr>
-          <p:cNvSpPr>
-            <a:spLocks noGrp="1"/>
-          </p:cNvSpPr>
-          <p:nvPr>
-            <p:ph type="dt" sz="half" idx="10"/>
-          </p:nvPr>
-        </p:nvSpPr>
-        <p:spPr/>
-        <p:txBody>
-          <a:bodyPr/>
-          <a:lstStyle/>
-          <a:p>
-            <a:fld id="{6DDC931E-8CBE-4A3F-A034-9B6122C6DCDB}" type="datetime3">
-              <a:rPr lang="en-US" smtClean="0"/>
-              <a:t>22 December 2025</a:t>
-            </a:fld>
-            <a:endParaRPr lang="en-US"/>
-          </a:p>
-        </p:txBody>
-      </p:sp>
-      <p:sp>
-        <p:nvSpPr>
-          <p:cNvPr id="3" name="Slide Number Placeholder 2">
-            <a:extLst>
-              <a:ext uri="{FF2B5EF4-FFF2-40B4-BE49-F238E27FC236}">
-                <a16:creationId xmlns:a16="http://schemas.microsoft.com/office/drawing/2014/main" id="{70701A8B-EB85-90A1-F4A4-3A425B9310BB}"/>
               </a:ext>
             </a:extLst>
           </p:cNvPr>
@@ -22427,7 +23875,7 @@
     </p:spTree>
     <p:extLst>
       <p:ext uri="{BB962C8B-B14F-4D97-AF65-F5344CB8AC3E}">
-        <p14:creationId xmlns:p14="http://schemas.microsoft.com/office/powerpoint/2010/main" val="2072483286"/>
+        <p14:creationId xmlns:p14="http://schemas.microsoft.com/office/powerpoint/2010/main" val="1685140285"/>
       </p:ext>
     </p:extLst>
   </p:cSld>
@@ -22994,6 +24442,15 @@
 
 <file path=customXml/item1.xml><?xml version="1.0" encoding="utf-8"?>
 <?mso-contentType ?>
+<FormTemplates xmlns="http://schemas.microsoft.com/sharepoint/v3/contenttype/forms">
+  <Display>DocumentLibraryForm</Display>
+  <Edit>DocumentLibraryForm</Edit>
+  <New>DocumentLibraryForm</New>
+</FormTemplates>
+</file>
+
+<file path=customXml/item2.xml><?xml version="1.0" encoding="utf-8"?>
+<?mso-contentType ?>
 <spe:Receivers xmlns:spe="http://schemas.microsoft.com/sharepoint/events">
   <Receiver>
     <Name>Document ID Generator</Name>
@@ -23042,138 +24499,7 @@
 </spe:Receivers>
 </file>
 
-<file path=customXml/item2.xml><?xml version="1.0" encoding="utf-8"?>
-<?mso-contentType ?>
-<FormTemplates xmlns="http://schemas.microsoft.com/sharepoint/v3/contenttype/forms">
-  <Display>DocumentLibraryForm</Display>
-  <Edit>DocumentLibraryForm</Edit>
-  <New>DocumentLibraryForm</New>
-</FormTemplates>
-</file>
-
 <file path=customXml/item3.xml><?xml version="1.0" encoding="utf-8"?>
-<p:properties xmlns:p="http://schemas.microsoft.com/office/2006/metadata/properties" xmlns:xsi="http://www.w3.org/2001/XMLSchema-instance" xmlns:pc="http://schemas.microsoft.com/office/infopath/2007/PartnerControls">
-  <documentManagement>
-    <Name_x0028_Outlook_x0029_ xmlns="819a213c-e595-4af7-868c-5311d0f07b09">
-      <UserInfo>
-        <DisplayName/>
-        <AccountId xsi:nil="true"/>
-        <AccountType/>
-      </UserInfo>
-    </Name_x0028_Outlook_x0029_>
-    <_ip_UnifiedCompliancePolicyUIAction xmlns="http://schemas.microsoft.com/sharepoint/v3" xsi:nil="true"/>
-    <TaxCatchAll xmlns="43c4306d-bcae-48a3-b5b4-6245fba36c72">
-      <Value>117</Value>
-      <Value>336</Value>
-      <Value>352</Value>
-      <Value>332</Value>
-      <Value>330</Value>
-      <Value>5</Value>
-      <Value>88</Value>
-      <Value>2</Value>
-      <Value>1</Value>
-    </TaxCatchAll>
-    <Project xmlns="819a213c-e595-4af7-868c-5311d0f07b09">Shrike</Project>
-    <b3e0283348f04d719dc2db6c1ad0eab0 xmlns="819a213c-e595-4af7-868c-5311d0f07b09">
-      <Terms xmlns="http://schemas.microsoft.com/office/infopath/2007/PartnerControls"/>
-    </b3e0283348f04d719dc2db6c1ad0eab0>
-    <kf4578e6b9744d06891b013fb9171991 xmlns="819a213c-e595-4af7-868c-5311d0f07b09">
-      <Terms xmlns="http://schemas.microsoft.com/office/infopath/2007/PartnerControls">
-        <TermInfo xmlns="http://schemas.microsoft.com/office/infopath/2007/PartnerControls">
-          <TermName xmlns="http://schemas.microsoft.com/office/infopath/2007/PartnerControls">FCAI</TermName>
-          <TermId xmlns="http://schemas.microsoft.com/office/infopath/2007/PartnerControls">fd9e9f27-4afa-4bd6-9815-b72522a6dee4</TermId>
-        </TermInfo>
-      </Terms>
-    </kf4578e6b9744d06891b013fb9171991>
-    <e7bf107ab2e246c2ae3b25ccb19c4fe7 xmlns="819a213c-e595-4af7-868c-5311d0f07b09">
-      <Terms xmlns="http://schemas.microsoft.com/office/infopath/2007/PartnerControls"/>
-    </e7bf107ab2e246c2ae3b25ccb19c4fe7>
-    <Status xmlns="819a213c-e595-4af7-868c-5311d0f07b09">NA</Status>
-    <k1cd0d7a50e348e5b2cecacdbb53a3ff xmlns="819a213c-e595-4af7-868c-5311d0f07b09">
-      <Terms xmlns="http://schemas.microsoft.com/office/infopath/2007/PartnerControls">
-        <TermInfo xmlns="http://schemas.microsoft.com/office/infopath/2007/PartnerControls">
-          <TermName xmlns="http://schemas.microsoft.com/office/infopath/2007/PartnerControls">NA</TermName>
-          <TermId xmlns="http://schemas.microsoft.com/office/infopath/2007/PartnerControls">6c779868-fdfe-4433-a583-74f72965e832</TermId>
-        </TermInfo>
-      </Terms>
-    </k1cd0d7a50e348e5b2cecacdbb53a3ff>
-    <k4bd3d618c344bb496a0035fa1bfa95e xmlns="819a213c-e595-4af7-868c-5311d0f07b09">
-      <Terms xmlns="http://schemas.microsoft.com/office/infopath/2007/PartnerControls">
-        <TermInfo xmlns="http://schemas.microsoft.com/office/infopath/2007/PartnerControls">
-          <TermName xmlns="http://schemas.microsoft.com/office/infopath/2007/PartnerControls">NA</TermName>
-          <TermId xmlns="http://schemas.microsoft.com/office/infopath/2007/PartnerControls">14e9068e-14f9-49cc-a753-38a742264b27</TermId>
-        </TermInfo>
-      </Terms>
-    </k4bd3d618c344bb496a0035fa1bfa95e>
-    <m3911d227d12438196938f21bccbb829 xmlns="819a213c-e595-4af7-868c-5311d0f07b09">
-      <Terms xmlns="http://schemas.microsoft.com/office/infopath/2007/PartnerControls">
-        <TermInfo xmlns="http://schemas.microsoft.com/office/infopath/2007/PartnerControls">
-          <TermName xmlns="http://schemas.microsoft.com/office/infopath/2007/PartnerControls">Unclassified</TermName>
-          <TermId xmlns="http://schemas.microsoft.com/office/infopath/2007/PartnerControls">0e44ab2e-9e75-4d69-bacf-b9adbba64961</TermId>
-        </TermInfo>
-      </Terms>
-    </m3911d227d12438196938f21bccbb829>
-    <j85403ed819e4ad59bb8aa44734c7278 xmlns="819a213c-e595-4af7-868c-5311d0f07b09">
-      <Terms xmlns="http://schemas.microsoft.com/office/infopath/2007/PartnerControls">
-        <TermInfo xmlns="http://schemas.microsoft.com/office/infopath/2007/PartnerControls">
-          <TermName xmlns="http://schemas.microsoft.com/office/infopath/2007/PartnerControls">NA</TermName>
-          <TermId xmlns="http://schemas.microsoft.com/office/infopath/2007/PartnerControls">c413e2e5-7da6-4fb4-9318-c07a4c95104c</TermId>
-        </TermInfo>
-      </Terms>
-    </j85403ed819e4ad59bb8aa44734c7278>
-    <e41571422c3345b4bda9d3ac979b0442 xmlns="819a213c-e595-4af7-868c-5311d0f07b09">
-      <Terms xmlns="http://schemas.microsoft.com/office/infopath/2007/PartnerControls">
-        <TermInfo xmlns="http://schemas.microsoft.com/office/infopath/2007/PartnerControls">
-          <TermName xmlns="http://schemas.microsoft.com/office/infopath/2007/PartnerControls">Destroy</TermName>
-          <TermId xmlns="http://schemas.microsoft.com/office/infopath/2007/PartnerControls">81460359-14dd-47b4-9102-5fada66d1614</TermId>
-        </TermInfo>
-      </Terms>
-    </e41571422c3345b4bda9d3ac979b0442>
-    <b2c7cbb6fa064dd095a8ebf73878e15c xmlns="819a213c-e595-4af7-868c-5311d0f07b09">
-      <Terms xmlns="http://schemas.microsoft.com/office/infopath/2007/PartnerControls">
-        <TermInfo xmlns="http://schemas.microsoft.com/office/infopath/2007/PartnerControls">
-          <TermName xmlns="http://schemas.microsoft.com/office/infopath/2007/PartnerControls">D</TermName>
-          <TermId xmlns="http://schemas.microsoft.com/office/infopath/2007/PartnerControls">e66b2925-d207-445d-a7ac-7bf5587a61c3</TermId>
-        </TermInfo>
-      </Terms>
-    </b2c7cbb6fa064dd095a8ebf73878e15c>
-    <n050dff107b041e7a8136cabb03c9f16 xmlns="819a213c-e595-4af7-868c-5311d0f07b09">
-      <Terms xmlns="http://schemas.microsoft.com/office/infopath/2007/PartnerControls"/>
-    </n050dff107b041e7a8136cabb03c9f16>
-    <dbcc5996da9743a2aff52ccb96daf316 xmlns="819a213c-e595-4af7-868c-5311d0f07b09">
-      <Terms xmlns="http://schemas.microsoft.com/office/infopath/2007/PartnerControls"/>
-    </dbcc5996da9743a2aff52ccb96daf316>
-    <_ip_UnifiedCompliancePolicyProperties xmlns="http://schemas.microsoft.com/sharepoint/v3" xsi:nil="true"/>
-    <Comments xmlns="819a213c-e595-4af7-868c-5311d0f07b09" xsi:nil="true"/>
-    <_dlc_DocIdPersistId xmlns="43c4306d-bcae-48a3-b5b4-6245fba36c72" xsi:nil="true"/>
-    <_dlc_DocIdUrl xmlns="43c4306d-bcae-48a3-b5b4-6245fba36c72">
-      <Url>https://armyeitaas.sharepoint-mil.us/teams/AI2CKMDevelopmentTeam/_layouts/15/DocIdRedir.aspx?ID=PNCAVZZWCJMJ-719779062-26496</Url>
-      <Description>PNCAVZZWCJMJ-719779062-26496</Description>
-    </_dlc_DocIdUrl>
-    <Teams xmlns="819a213c-e595-4af7-868c-5311d0f07b09">NA</Teams>
-    <lcf76f155ced4ddcb4097134ff3c332f xmlns="819a213c-e595-4af7-868c-5311d0f07b09">
-      <Terms xmlns="http://schemas.microsoft.com/office/infopath/2007/PartnerControls"/>
-    </lcf76f155ced4ddcb4097134ff3c332f>
-    <kf187aa08ef840c0be306c2b7cf181cc xmlns="819a213c-e595-4af7-868c-5311d0f07b09">
-      <Terms xmlns="http://schemas.microsoft.com/office/infopath/2007/PartnerControls"/>
-    </kf187aa08ef840c0be306c2b7cf181cc>
-    <k8ed72fc0ac74230bc2bce9a30aa3ff1 xmlns="819a213c-e595-4af7-868c-5311d0f07b09">
-      <Terms xmlns="http://schemas.microsoft.com/office/infopath/2007/PartnerControls"/>
-    </k8ed72fc0ac74230bc2bce9a30aa3ff1>
-    <j3cec2dc15da4ea9ae4c2914aab734b8 xmlns="819a213c-e595-4af7-868c-5311d0f07b09">
-      <Terms xmlns="http://schemas.microsoft.com/office/infopath/2007/PartnerControls">
-        <TermInfo xmlns="http://schemas.microsoft.com/office/infopath/2007/PartnerControls">
-          <TermName xmlns="http://schemas.microsoft.com/office/infopath/2007/PartnerControls">Unofficial</TermName>
-          <TermId xmlns="http://schemas.microsoft.com/office/infopath/2007/PartnerControls">fb72a3e1-cd07-4e90-8aa1-1e35bcf7448f</TermId>
-        </TermInfo>
-      </Terms>
-    </j3cec2dc15da4ea9ae4c2914aab734b8>
-    <_dlc_DocId xmlns="43c4306d-bcae-48a3-b5b4-6245fba36c72">PNCAVZZWCJMJ-719779062-26496</_dlc_DocId>
-  </documentManagement>
-</p:properties>
-</file>
-
-<file path=customXml/item4.xml><?xml version="1.0" encoding="utf-8"?>
 <ct:contentTypeSchema xmlns:ct="http://schemas.microsoft.com/office/2006/metadata/contentType" xmlns:ma="http://schemas.microsoft.com/office/2006/metadata/properties/metaAttributes" ct:_="" ma:_="" ma:contentTypeName="Document" ma:contentTypeID="0x010100744FEF590B341F46AAAF568C3B82DA74" ma:contentTypeVersion="126" ma:contentTypeDescription="Create a new document." ma:contentTypeScope="" ma:versionID="da2759216466bc3ec804369b15a902a5">
   <xsd:schema xmlns:xsd="http://www.w3.org/2001/XMLSchema" xmlns:xs="http://www.w3.org/2001/XMLSchema" xmlns:p="http://schemas.microsoft.com/office/2006/metadata/properties" xmlns:ns1="http://schemas.microsoft.com/sharepoint/v3" xmlns:ns2="819a213c-e595-4af7-868c-5311d0f07b09" xmlns:ns3="43c4306d-bcae-48a3-b5b4-6245fba36c72" targetNamespace="http://schemas.microsoft.com/office/2006/metadata/properties" ma:root="true" ma:fieldsID="23a203c7101a14e7e286c2f61aba86b7" ns1:_="" ns2:_="" ns3:_="">
     <xsd:import namespace="http://schemas.microsoft.com/sharepoint/v3"/>
@@ -23632,7 +24958,137 @@
 </ct:contentTypeSchema>
 </file>
 
+<file path=customXml/item4.xml><?xml version="1.0" encoding="utf-8"?>
+<p:properties xmlns:p="http://schemas.microsoft.com/office/2006/metadata/properties" xmlns:xsi="http://www.w3.org/2001/XMLSchema-instance" xmlns:pc="http://schemas.microsoft.com/office/infopath/2007/PartnerControls">
+  <documentManagement>
+    <Name_x0028_Outlook_x0029_ xmlns="819a213c-e595-4af7-868c-5311d0f07b09">
+      <UserInfo>
+        <DisplayName/>
+        <AccountId xsi:nil="true"/>
+        <AccountType/>
+      </UserInfo>
+    </Name_x0028_Outlook_x0029_>
+    <_ip_UnifiedCompliancePolicyUIAction xmlns="http://schemas.microsoft.com/sharepoint/v3" xsi:nil="true"/>
+    <TaxCatchAll xmlns="43c4306d-bcae-48a3-b5b4-6245fba36c72">
+      <Value>117</Value>
+      <Value>336</Value>
+      <Value>352</Value>
+      <Value>332</Value>
+      <Value>330</Value>
+      <Value>5</Value>
+      <Value>88</Value>
+      <Value>2</Value>
+      <Value>1</Value>
+    </TaxCatchAll>
+    <Project xmlns="819a213c-e595-4af7-868c-5311d0f07b09">Shrike</Project>
+    <b3e0283348f04d719dc2db6c1ad0eab0 xmlns="819a213c-e595-4af7-868c-5311d0f07b09">
+      <Terms xmlns="http://schemas.microsoft.com/office/infopath/2007/PartnerControls"/>
+    </b3e0283348f04d719dc2db6c1ad0eab0>
+    <kf4578e6b9744d06891b013fb9171991 xmlns="819a213c-e595-4af7-868c-5311d0f07b09">
+      <Terms xmlns="http://schemas.microsoft.com/office/infopath/2007/PartnerControls">
+        <TermInfo xmlns="http://schemas.microsoft.com/office/infopath/2007/PartnerControls">
+          <TermName xmlns="http://schemas.microsoft.com/office/infopath/2007/PartnerControls">FCAI</TermName>
+          <TermId xmlns="http://schemas.microsoft.com/office/infopath/2007/PartnerControls">fd9e9f27-4afa-4bd6-9815-b72522a6dee4</TermId>
+        </TermInfo>
+      </Terms>
+    </kf4578e6b9744d06891b013fb9171991>
+    <e7bf107ab2e246c2ae3b25ccb19c4fe7 xmlns="819a213c-e595-4af7-868c-5311d0f07b09">
+      <Terms xmlns="http://schemas.microsoft.com/office/infopath/2007/PartnerControls"/>
+    </e7bf107ab2e246c2ae3b25ccb19c4fe7>
+    <Status xmlns="819a213c-e595-4af7-868c-5311d0f07b09">NA</Status>
+    <k1cd0d7a50e348e5b2cecacdbb53a3ff xmlns="819a213c-e595-4af7-868c-5311d0f07b09">
+      <Terms xmlns="http://schemas.microsoft.com/office/infopath/2007/PartnerControls">
+        <TermInfo xmlns="http://schemas.microsoft.com/office/infopath/2007/PartnerControls">
+          <TermName xmlns="http://schemas.microsoft.com/office/infopath/2007/PartnerControls">NA</TermName>
+          <TermId xmlns="http://schemas.microsoft.com/office/infopath/2007/PartnerControls">6c779868-fdfe-4433-a583-74f72965e832</TermId>
+        </TermInfo>
+      </Terms>
+    </k1cd0d7a50e348e5b2cecacdbb53a3ff>
+    <k4bd3d618c344bb496a0035fa1bfa95e xmlns="819a213c-e595-4af7-868c-5311d0f07b09">
+      <Terms xmlns="http://schemas.microsoft.com/office/infopath/2007/PartnerControls">
+        <TermInfo xmlns="http://schemas.microsoft.com/office/infopath/2007/PartnerControls">
+          <TermName xmlns="http://schemas.microsoft.com/office/infopath/2007/PartnerControls">NA</TermName>
+          <TermId xmlns="http://schemas.microsoft.com/office/infopath/2007/PartnerControls">14e9068e-14f9-49cc-a753-38a742264b27</TermId>
+        </TermInfo>
+      </Terms>
+    </k4bd3d618c344bb496a0035fa1bfa95e>
+    <m3911d227d12438196938f21bccbb829 xmlns="819a213c-e595-4af7-868c-5311d0f07b09">
+      <Terms xmlns="http://schemas.microsoft.com/office/infopath/2007/PartnerControls">
+        <TermInfo xmlns="http://schemas.microsoft.com/office/infopath/2007/PartnerControls">
+          <TermName xmlns="http://schemas.microsoft.com/office/infopath/2007/PartnerControls">Unclassified</TermName>
+          <TermId xmlns="http://schemas.microsoft.com/office/infopath/2007/PartnerControls">0e44ab2e-9e75-4d69-bacf-b9adbba64961</TermId>
+        </TermInfo>
+      </Terms>
+    </m3911d227d12438196938f21bccbb829>
+    <j85403ed819e4ad59bb8aa44734c7278 xmlns="819a213c-e595-4af7-868c-5311d0f07b09">
+      <Terms xmlns="http://schemas.microsoft.com/office/infopath/2007/PartnerControls">
+        <TermInfo xmlns="http://schemas.microsoft.com/office/infopath/2007/PartnerControls">
+          <TermName xmlns="http://schemas.microsoft.com/office/infopath/2007/PartnerControls">NA</TermName>
+          <TermId xmlns="http://schemas.microsoft.com/office/infopath/2007/PartnerControls">c413e2e5-7da6-4fb4-9318-c07a4c95104c</TermId>
+        </TermInfo>
+      </Terms>
+    </j85403ed819e4ad59bb8aa44734c7278>
+    <e41571422c3345b4bda9d3ac979b0442 xmlns="819a213c-e595-4af7-868c-5311d0f07b09">
+      <Terms xmlns="http://schemas.microsoft.com/office/infopath/2007/PartnerControls">
+        <TermInfo xmlns="http://schemas.microsoft.com/office/infopath/2007/PartnerControls">
+          <TermName xmlns="http://schemas.microsoft.com/office/infopath/2007/PartnerControls">Destroy</TermName>
+          <TermId xmlns="http://schemas.microsoft.com/office/infopath/2007/PartnerControls">81460359-14dd-47b4-9102-5fada66d1614</TermId>
+        </TermInfo>
+      </Terms>
+    </e41571422c3345b4bda9d3ac979b0442>
+    <b2c7cbb6fa064dd095a8ebf73878e15c xmlns="819a213c-e595-4af7-868c-5311d0f07b09">
+      <Terms xmlns="http://schemas.microsoft.com/office/infopath/2007/PartnerControls">
+        <TermInfo xmlns="http://schemas.microsoft.com/office/infopath/2007/PartnerControls">
+          <TermName xmlns="http://schemas.microsoft.com/office/infopath/2007/PartnerControls">D</TermName>
+          <TermId xmlns="http://schemas.microsoft.com/office/infopath/2007/PartnerControls">e66b2925-d207-445d-a7ac-7bf5587a61c3</TermId>
+        </TermInfo>
+      </Terms>
+    </b2c7cbb6fa064dd095a8ebf73878e15c>
+    <n050dff107b041e7a8136cabb03c9f16 xmlns="819a213c-e595-4af7-868c-5311d0f07b09">
+      <Terms xmlns="http://schemas.microsoft.com/office/infopath/2007/PartnerControls"/>
+    </n050dff107b041e7a8136cabb03c9f16>
+    <dbcc5996da9743a2aff52ccb96daf316 xmlns="819a213c-e595-4af7-868c-5311d0f07b09">
+      <Terms xmlns="http://schemas.microsoft.com/office/infopath/2007/PartnerControls"/>
+    </dbcc5996da9743a2aff52ccb96daf316>
+    <_ip_UnifiedCompliancePolicyProperties xmlns="http://schemas.microsoft.com/sharepoint/v3" xsi:nil="true"/>
+    <Comments xmlns="819a213c-e595-4af7-868c-5311d0f07b09" xsi:nil="true"/>
+    <_dlc_DocIdPersistId xmlns="43c4306d-bcae-48a3-b5b4-6245fba36c72" xsi:nil="true"/>
+    <_dlc_DocIdUrl xmlns="43c4306d-bcae-48a3-b5b4-6245fba36c72">
+      <Url>https://armyeitaas.sharepoint-mil.us/teams/AI2CKMDevelopmentTeam/_layouts/15/DocIdRedir.aspx?ID=PNCAVZZWCJMJ-719779062-26496</Url>
+      <Description>PNCAVZZWCJMJ-719779062-26496</Description>
+    </_dlc_DocIdUrl>
+    <Teams xmlns="819a213c-e595-4af7-868c-5311d0f07b09">NA</Teams>
+    <lcf76f155ced4ddcb4097134ff3c332f xmlns="819a213c-e595-4af7-868c-5311d0f07b09">
+      <Terms xmlns="http://schemas.microsoft.com/office/infopath/2007/PartnerControls"/>
+    </lcf76f155ced4ddcb4097134ff3c332f>
+    <kf187aa08ef840c0be306c2b7cf181cc xmlns="819a213c-e595-4af7-868c-5311d0f07b09">
+      <Terms xmlns="http://schemas.microsoft.com/office/infopath/2007/PartnerControls"/>
+    </kf187aa08ef840c0be306c2b7cf181cc>
+    <k8ed72fc0ac74230bc2bce9a30aa3ff1 xmlns="819a213c-e595-4af7-868c-5311d0f07b09">
+      <Terms xmlns="http://schemas.microsoft.com/office/infopath/2007/PartnerControls"/>
+    </k8ed72fc0ac74230bc2bce9a30aa3ff1>
+    <j3cec2dc15da4ea9ae4c2914aab734b8 xmlns="819a213c-e595-4af7-868c-5311d0f07b09">
+      <Terms xmlns="http://schemas.microsoft.com/office/infopath/2007/PartnerControls">
+        <TermInfo xmlns="http://schemas.microsoft.com/office/infopath/2007/PartnerControls">
+          <TermName xmlns="http://schemas.microsoft.com/office/infopath/2007/PartnerControls">Unofficial</TermName>
+          <TermId xmlns="http://schemas.microsoft.com/office/infopath/2007/PartnerControls">fb72a3e1-cd07-4e90-8aa1-1e35bcf7448f</TermId>
+        </TermInfo>
+      </Terms>
+    </j3cec2dc15da4ea9ae4c2914aab734b8>
+    <_dlc_DocId xmlns="43c4306d-bcae-48a3-b5b4-6245fba36c72">PNCAVZZWCJMJ-719779062-26496</_dlc_DocId>
+  </documentManagement>
+</p:properties>
+</file>
+
 <file path=customXml/itemProps1.xml><?xml version="1.0" encoding="utf-8"?>
+<ds:datastoreItem xmlns:ds="http://schemas.openxmlformats.org/officeDocument/2006/customXml" ds:itemID="{D5CBC06A-5433-41AC-89E1-93399C4B6D23}">
+  <ds:schemaRefs>
+    <ds:schemaRef ds:uri="http://schemas.microsoft.com/sharepoint/v3/contenttype/forms"/>
+  </ds:schemaRefs>
+</ds:datastoreItem>
+</file>
+
+<file path=customXml/itemProps2.xml><?xml version="1.0" encoding="utf-8"?>
 <ds:datastoreItem xmlns:ds="http://schemas.openxmlformats.org/officeDocument/2006/customXml" ds:itemID="{1C5A9CCD-8D95-4E29-9BBC-62ED344D200A}">
   <ds:schemaRefs>
     <ds:schemaRef ds:uri="http://schemas.microsoft.com/sharepoint/events"/>
@@ -23640,27 +25096,7 @@
 </ds:datastoreItem>
 </file>
 
-<file path=customXml/itemProps2.xml><?xml version="1.0" encoding="utf-8"?>
-<ds:datastoreItem xmlns:ds="http://schemas.openxmlformats.org/officeDocument/2006/customXml" ds:itemID="{D5CBC06A-5433-41AC-89E1-93399C4B6D23}">
-  <ds:schemaRefs>
-    <ds:schemaRef ds:uri="http://schemas.microsoft.com/sharepoint/v3/contenttype/forms"/>
-  </ds:schemaRefs>
-</ds:datastoreItem>
-</file>
-
 <file path=customXml/itemProps3.xml><?xml version="1.0" encoding="utf-8"?>
-<ds:datastoreItem xmlns:ds="http://schemas.openxmlformats.org/officeDocument/2006/customXml" ds:itemID="{C64B5808-DACA-4273-92AE-F78AD06EB5C9}">
-  <ds:schemaRefs>
-    <ds:schemaRef ds:uri="http://schemas.microsoft.com/office/2006/metadata/properties"/>
-    <ds:schemaRef ds:uri="http://schemas.microsoft.com/office/infopath/2007/PartnerControls"/>
-    <ds:schemaRef ds:uri="819a213c-e595-4af7-868c-5311d0f07b09"/>
-    <ds:schemaRef ds:uri="http://schemas.microsoft.com/sharepoint/v3"/>
-    <ds:schemaRef ds:uri="43c4306d-bcae-48a3-b5b4-6245fba36c72"/>
-  </ds:schemaRefs>
-</ds:datastoreItem>
-</file>
-
-<file path=customXml/itemProps4.xml><?xml version="1.0" encoding="utf-8"?>
 <ds:datastoreItem xmlns:ds="http://schemas.openxmlformats.org/officeDocument/2006/customXml" ds:itemID="{8F325A96-F9CD-4C1F-BC68-5ED8156DC1C7}">
   <ds:schemaRefs>
     <ds:schemaRef ds:uri="http://schemas.microsoft.com/office/2006/metadata/contentType"/>
@@ -23680,6 +25116,18 @@
 </ds:datastoreItem>
 </file>
 
+<file path=customXml/itemProps4.xml><?xml version="1.0" encoding="utf-8"?>
+<ds:datastoreItem xmlns:ds="http://schemas.openxmlformats.org/officeDocument/2006/customXml" ds:itemID="{C64B5808-DACA-4273-92AE-F78AD06EB5C9}">
+  <ds:schemaRefs>
+    <ds:schemaRef ds:uri="http://schemas.microsoft.com/office/2006/metadata/properties"/>
+    <ds:schemaRef ds:uri="http://schemas.microsoft.com/office/infopath/2007/PartnerControls"/>
+    <ds:schemaRef ds:uri="819a213c-e595-4af7-868c-5311d0f07b09"/>
+    <ds:schemaRef ds:uri="http://schemas.microsoft.com/sharepoint/v3"/>
+    <ds:schemaRef ds:uri="43c4306d-bcae-48a3-b5b4-6245fba36c72"/>
+  </ds:schemaRefs>
+</ds:datastoreItem>
+</file>
+
 <file path=docMetadata/LabelInfo.xml><?xml version="1.0" encoding="utf-8"?>
 <clbl:labelList xmlns:clbl="http://schemas.microsoft.com/office/2020/mipLabelMetadata">
   <clbl:label id="{554eecc5-e26c-4620-b240-5a8bb326c33d}" enabled="1" method="Privileged" siteId="{fae6d70f-954b-4811-92b6-0530d6f84c43}" contentBits="0" removed="0"/>

</xml_diff>